<commit_message>
Updating Data Menu U Guide
</commit_message>
<xml_diff>
--- a/iNZight/img/user_guides/dataset/Pictures _datasets.pptx
+++ b/iNZight/img/user_guides/dataset/Pictures _datasets.pptx
@@ -5,8 +5,8 @@
     <p:sldMasterId id="2147483648" r:id="rId1"/>
   </p:sldMasterIdLst>
   <p:sldIdLst>
-    <p:sldId id="257" r:id="rId2"/>
-    <p:sldId id="260" r:id="rId3"/>
+    <p:sldId id="260" r:id="rId2"/>
+    <p:sldId id="261" r:id="rId3"/>
   </p:sldIdLst>
   <p:sldSz cx="12192000" cy="6858000"/>
   <p:notesSz cx="6858000" cy="9144000"/>
@@ -244,7 +244,7 @@
           <a:p>
             <a:fld id="{F82F713A-5EB9-4B7A-B87D-F2B7940161AF}" type="datetimeFigureOut">
               <a:rPr lang="en-NZ" smtClean="0"/>
-              <a:t>15/05/2019</a:t>
+              <a:t>15/04/2020</a:t>
             </a:fld>
             <a:endParaRPr lang="en-NZ"/>
           </a:p>
@@ -414,7 +414,7 @@
           <a:p>
             <a:fld id="{F82F713A-5EB9-4B7A-B87D-F2B7940161AF}" type="datetimeFigureOut">
               <a:rPr lang="en-NZ" smtClean="0"/>
-              <a:t>15/05/2019</a:t>
+              <a:t>15/04/2020</a:t>
             </a:fld>
             <a:endParaRPr lang="en-NZ"/>
           </a:p>
@@ -594,7 +594,7 @@
           <a:p>
             <a:fld id="{F82F713A-5EB9-4B7A-B87D-F2B7940161AF}" type="datetimeFigureOut">
               <a:rPr lang="en-NZ" smtClean="0"/>
-              <a:t>15/05/2019</a:t>
+              <a:t>15/04/2020</a:t>
             </a:fld>
             <a:endParaRPr lang="en-NZ"/>
           </a:p>
@@ -764,7 +764,7 @@
           <a:p>
             <a:fld id="{F82F713A-5EB9-4B7A-B87D-F2B7940161AF}" type="datetimeFigureOut">
               <a:rPr lang="en-NZ" smtClean="0"/>
-              <a:t>15/05/2019</a:t>
+              <a:t>15/04/2020</a:t>
             </a:fld>
             <a:endParaRPr lang="en-NZ"/>
           </a:p>
@@ -1010,7 +1010,7 @@
           <a:p>
             <a:fld id="{F82F713A-5EB9-4B7A-B87D-F2B7940161AF}" type="datetimeFigureOut">
               <a:rPr lang="en-NZ" smtClean="0"/>
-              <a:t>15/05/2019</a:t>
+              <a:t>15/04/2020</a:t>
             </a:fld>
             <a:endParaRPr lang="en-NZ"/>
           </a:p>
@@ -1242,7 +1242,7 @@
           <a:p>
             <a:fld id="{F82F713A-5EB9-4B7A-B87D-F2B7940161AF}" type="datetimeFigureOut">
               <a:rPr lang="en-NZ" smtClean="0"/>
-              <a:t>15/05/2019</a:t>
+              <a:t>15/04/2020</a:t>
             </a:fld>
             <a:endParaRPr lang="en-NZ"/>
           </a:p>
@@ -1609,7 +1609,7 @@
           <a:p>
             <a:fld id="{F82F713A-5EB9-4B7A-B87D-F2B7940161AF}" type="datetimeFigureOut">
               <a:rPr lang="en-NZ" smtClean="0"/>
-              <a:t>15/05/2019</a:t>
+              <a:t>15/04/2020</a:t>
             </a:fld>
             <a:endParaRPr lang="en-NZ"/>
           </a:p>
@@ -1727,7 +1727,7 @@
           <a:p>
             <a:fld id="{F82F713A-5EB9-4B7A-B87D-F2B7940161AF}" type="datetimeFigureOut">
               <a:rPr lang="en-NZ" smtClean="0"/>
-              <a:t>15/05/2019</a:t>
+              <a:t>15/04/2020</a:t>
             </a:fld>
             <a:endParaRPr lang="en-NZ"/>
           </a:p>
@@ -1822,7 +1822,7 @@
           <a:p>
             <a:fld id="{F82F713A-5EB9-4B7A-B87D-F2B7940161AF}" type="datetimeFigureOut">
               <a:rPr lang="en-NZ" smtClean="0"/>
-              <a:t>15/05/2019</a:t>
+              <a:t>15/04/2020</a:t>
             </a:fld>
             <a:endParaRPr lang="en-NZ"/>
           </a:p>
@@ -2099,7 +2099,7 @@
           <a:p>
             <a:fld id="{F82F713A-5EB9-4B7A-B87D-F2B7940161AF}" type="datetimeFigureOut">
               <a:rPr lang="en-NZ" smtClean="0"/>
-              <a:t>15/05/2019</a:t>
+              <a:t>15/04/2020</a:t>
             </a:fld>
             <a:endParaRPr lang="en-NZ"/>
           </a:p>
@@ -2356,7 +2356,7 @@
           <a:p>
             <a:fld id="{F82F713A-5EB9-4B7A-B87D-F2B7940161AF}" type="datetimeFigureOut">
               <a:rPr lang="en-NZ" smtClean="0"/>
-              <a:t>15/05/2019</a:t>
+              <a:t>15/04/2020</a:t>
             </a:fld>
             <a:endParaRPr lang="en-NZ"/>
           </a:p>
@@ -2569,7 +2569,7 @@
           <a:p>
             <a:fld id="{F82F713A-5EB9-4B7A-B87D-F2B7940161AF}" type="datetimeFigureOut">
               <a:rPr lang="en-NZ" smtClean="0"/>
-              <a:t>15/05/2019</a:t>
+              <a:t>15/04/2020</a:t>
             </a:fld>
             <a:endParaRPr lang="en-NZ"/>
           </a:p>
@@ -2976,177 +2976,6 @@
       </p:grpSpPr>
       <p:grpSp>
         <p:nvGrpSpPr>
-          <p:cNvPr id="8" name="Group 7"/>
-          <p:cNvGrpSpPr/>
-          <p:nvPr/>
-        </p:nvGrpSpPr>
-        <p:grpSpPr>
-          <a:xfrm>
-            <a:off x="2227608" y="1257598"/>
-            <a:ext cx="2571429" cy="3551843"/>
-            <a:chOff x="2227608" y="1257598"/>
-            <a:chExt cx="2571429" cy="3551843"/>
-          </a:xfrm>
-        </p:grpSpPr>
-        <p:pic>
-          <p:nvPicPr>
-            <p:cNvPr id="2" name="Picture 1"/>
-            <p:cNvPicPr>
-              <a:picLocks noChangeAspect="1"/>
-            </p:cNvPicPr>
-            <p:nvPr/>
-          </p:nvPicPr>
-          <p:blipFill>
-            <a:blip r:embed="rId2">
-              <a:extLst>
-                <a:ext uri="{28A0092B-C50C-407E-A947-70E740481C1C}">
-                  <a14:useLocalDpi xmlns:a14="http://schemas.microsoft.com/office/drawing/2010/main" val="0"/>
-                </a:ext>
-              </a:extLst>
-            </a:blip>
-            <a:stretch>
-              <a:fillRect/>
-            </a:stretch>
-          </p:blipFill>
-          <p:spPr>
-            <a:xfrm>
-              <a:off x="2227608" y="1257598"/>
-              <a:ext cx="2571429" cy="3514286"/>
-            </a:xfrm>
-            <a:prstGeom prst="rect">
-              <a:avLst/>
-            </a:prstGeom>
-          </p:spPr>
-        </p:pic>
-        <p:sp>
-          <p:nvSpPr>
-            <p:cNvPr id="5" name="Rectangle 4"/>
-            <p:cNvSpPr/>
-            <p:nvPr/>
-          </p:nvSpPr>
-          <p:spPr>
-            <a:xfrm>
-              <a:off x="2586590" y="4617467"/>
-              <a:ext cx="2187487" cy="191974"/>
-            </a:xfrm>
-            <a:prstGeom prst="rect">
-              <a:avLst/>
-            </a:prstGeom>
-            <a:solidFill>
-              <a:srgbClr val="FFFFFF">
-                <a:alpha val="69804"/>
-              </a:srgbClr>
-            </a:solidFill>
-            <a:ln>
-              <a:noFill/>
-            </a:ln>
-          </p:spPr>
-          <p:style>
-            <a:lnRef idx="2">
-              <a:schemeClr val="accent1">
-                <a:shade val="50000"/>
-              </a:schemeClr>
-            </a:lnRef>
-            <a:fillRef idx="1">
-              <a:schemeClr val="accent1"/>
-            </a:fillRef>
-            <a:effectRef idx="0">
-              <a:schemeClr val="accent1"/>
-            </a:effectRef>
-            <a:fontRef idx="minor">
-              <a:schemeClr val="lt1"/>
-            </a:fontRef>
-          </p:style>
-          <p:txBody>
-            <a:bodyPr rtlCol="0" anchor="ctr"/>
-            <a:lstStyle/>
-            <a:p>
-              <a:pPr algn="ctr"/>
-              <a:endParaRPr lang="en-NZ"/>
-            </a:p>
-          </p:txBody>
-        </p:sp>
-        <p:sp>
-          <p:nvSpPr>
-            <p:cNvPr id="7" name="Rectangle 6"/>
-            <p:cNvSpPr/>
-            <p:nvPr/>
-          </p:nvSpPr>
-          <p:spPr>
-            <a:xfrm flipH="1">
-              <a:off x="4644831" y="1737864"/>
-              <a:ext cx="144102" cy="2879603"/>
-            </a:xfrm>
-            <a:prstGeom prst="rect">
-              <a:avLst/>
-            </a:prstGeom>
-            <a:solidFill>
-              <a:srgbClr val="FFFFFF">
-                <a:alpha val="69804"/>
-              </a:srgbClr>
-            </a:solidFill>
-            <a:ln>
-              <a:noFill/>
-            </a:ln>
-          </p:spPr>
-          <p:style>
-            <a:lnRef idx="2">
-              <a:schemeClr val="accent1">
-                <a:shade val="50000"/>
-              </a:schemeClr>
-            </a:lnRef>
-            <a:fillRef idx="1">
-              <a:schemeClr val="accent1"/>
-            </a:fillRef>
-            <a:effectRef idx="0">
-              <a:schemeClr val="accent1"/>
-            </a:effectRef>
-            <a:fontRef idx="minor">
-              <a:schemeClr val="lt1"/>
-            </a:fontRef>
-          </p:style>
-          <p:txBody>
-            <a:bodyPr rtlCol="0" anchor="ctr"/>
-            <a:lstStyle/>
-            <a:p>
-              <a:pPr algn="ctr"/>
-              <a:endParaRPr lang="en-NZ"/>
-            </a:p>
-          </p:txBody>
-        </p:sp>
-      </p:grpSp>
-    </p:spTree>
-    <p:extLst>
-      <p:ext uri="{BB962C8B-B14F-4D97-AF65-F5344CB8AC3E}">
-        <p14:creationId xmlns:p14="http://schemas.microsoft.com/office/powerpoint/2010/main" val="3977174008"/>
-      </p:ext>
-    </p:extLst>
-  </p:cSld>
-  <p:clrMapOvr>
-    <a:masterClrMapping/>
-  </p:clrMapOvr>
-</p:sld>
-</file>
-
-<file path=ppt/slides/slide2.xml><?xml version="1.0" encoding="utf-8"?>
-<p:sld xmlns:a="http://schemas.openxmlformats.org/drawingml/2006/main" xmlns:r="http://schemas.openxmlformats.org/officeDocument/2006/relationships" xmlns:p="http://schemas.openxmlformats.org/presentationml/2006/main">
-  <p:cSld>
-    <p:spTree>
-      <p:nvGrpSpPr>
-        <p:cNvPr id="1" name=""/>
-        <p:cNvGrpSpPr/>
-        <p:nvPr/>
-      </p:nvGrpSpPr>
-      <p:grpSpPr>
-        <a:xfrm>
-          <a:off x="0" y="0"/>
-          <a:ext cx="0" cy="0"/>
-          <a:chOff x="0" y="0"/>
-          <a:chExt cx="0" cy="0"/>
-        </a:xfrm>
-      </p:grpSpPr>
-      <p:grpSp>
-        <p:nvGrpSpPr>
           <p:cNvPr id="16" name="Group 15"/>
           <p:cNvGrpSpPr/>
           <p:nvPr/>
@@ -3410,6 +3239,117 @@
     <p:extLst>
       <p:ext uri="{BB962C8B-B14F-4D97-AF65-F5344CB8AC3E}">
         <p14:creationId xmlns:p14="http://schemas.microsoft.com/office/powerpoint/2010/main" val="3731857715"/>
+      </p:ext>
+    </p:extLst>
+  </p:cSld>
+  <p:clrMapOvr>
+    <a:masterClrMapping/>
+  </p:clrMapOvr>
+</p:sld>
+</file>
+
+<file path=ppt/slides/slide2.xml><?xml version="1.0" encoding="utf-8"?>
+<p:sld xmlns:a="http://schemas.openxmlformats.org/drawingml/2006/main" xmlns:r="http://schemas.openxmlformats.org/officeDocument/2006/relationships" xmlns:p="http://schemas.openxmlformats.org/presentationml/2006/main">
+  <p:cSld>
+    <p:spTree>
+      <p:nvGrpSpPr>
+        <p:cNvPr id="1" name=""/>
+        <p:cNvGrpSpPr/>
+        <p:nvPr/>
+      </p:nvGrpSpPr>
+      <p:grpSpPr>
+        <a:xfrm>
+          <a:off x="0" y="0"/>
+          <a:ext cx="0" cy="0"/>
+          <a:chOff x="0" y="0"/>
+          <a:chExt cx="0" cy="0"/>
+        </a:xfrm>
+      </p:grpSpPr>
+      <p:graphicFrame>
+        <p:nvGraphicFramePr>
+          <p:cNvPr id="2" name="Object 1"/>
+          <p:cNvGraphicFramePr>
+            <a:graphicFrameLocks noChangeAspect="1"/>
+          </p:cNvGraphicFramePr>
+          <p:nvPr>
+            <p:extLst>
+              <p:ext uri="{D42A27DB-BD31-4B8C-83A1-F6EECF244321}">
+                <p14:modId xmlns:p14="http://schemas.microsoft.com/office/powerpoint/2010/main" val="540428882"/>
+              </p:ext>
+            </p:extLst>
+          </p:nvPr>
+        </p:nvGraphicFramePr>
+        <p:xfrm>
+          <a:off x="844457" y="957170"/>
+          <a:ext cx="3089275" cy="2860675"/>
+        </p:xfrm>
+        <a:graphic>
+          <a:graphicData uri="http://schemas.openxmlformats.org/presentationml/2006/ole">
+            <mc:AlternateContent xmlns:mc="http://schemas.openxmlformats.org/markup-compatibility/2006">
+              <mc:Choice xmlns:v="urn:schemas-microsoft-com:vml" Requires="v">
+                <p:oleObj spid="_x0000_s1027" r:id="rId3" imgW="12317400" imgH="11491920" progId="">
+                  <p:embed/>
+                </p:oleObj>
+              </mc:Choice>
+              <mc:Fallback>
+                <p:oleObj r:id="rId3" imgW="12317400" imgH="11491920" progId="">
+                  <p:embed/>
+                  <p:pic>
+                    <p:nvPicPr>
+                      <p:cNvPr id="0" name=""/>
+                      <p:cNvPicPr/>
+                      <p:nvPr/>
+                    </p:nvPicPr>
+                    <p:blipFill>
+                      <a:blip r:embed="rId4"/>
+                      <a:stretch>
+                        <a:fillRect/>
+                      </a:stretch>
+                    </p:blipFill>
+                    <p:spPr>
+                      <a:xfrm>
+                        <a:off x="844457" y="957170"/>
+                        <a:ext cx="3089275" cy="2860675"/>
+                      </a:xfrm>
+                      <a:prstGeom prst="rect">
+                        <a:avLst/>
+                      </a:prstGeom>
+                    </p:spPr>
+                  </p:pic>
+                </p:oleObj>
+              </mc:Fallback>
+            </mc:AlternateContent>
+          </a:graphicData>
+        </a:graphic>
+      </p:graphicFrame>
+      <p:pic>
+        <p:nvPicPr>
+          <p:cNvPr id="3" name="Picture 2"/>
+          <p:cNvPicPr>
+            <a:picLocks noChangeAspect="1"/>
+          </p:cNvPicPr>
+          <p:nvPr/>
+        </p:nvPicPr>
+        <p:blipFill>
+          <a:blip r:embed="rId5"/>
+          <a:stretch>
+            <a:fillRect/>
+          </a:stretch>
+        </p:blipFill>
+        <p:spPr>
+          <a:xfrm>
+            <a:off x="4204449" y="997594"/>
+            <a:ext cx="2800052" cy="1898005"/>
+          </a:xfrm>
+          <a:prstGeom prst="rect">
+            <a:avLst/>
+          </a:prstGeom>
+        </p:spPr>
+      </p:pic>
+    </p:spTree>
+    <p:extLst>
+      <p:ext uri="{BB962C8B-B14F-4D97-AF65-F5344CB8AC3E}">
+        <p14:creationId xmlns:p14="http://schemas.microsoft.com/office/powerpoint/2010/main" val="489632905"/>
       </p:ext>
     </p:extLst>
   </p:cSld>

</xml_diff>

<commit_message>
User Guide items for survey designs
</commit_message>
<xml_diff>
--- a/iNZight/img/user_guides/dataset/Pictures _datasets.pptx
+++ b/iNZight/img/user_guides/dataset/Pictures _datasets.pptx
@@ -7,6 +7,7 @@
   <p:sldIdLst>
     <p:sldId id="260" r:id="rId2"/>
     <p:sldId id="261" r:id="rId3"/>
+    <p:sldId id="262" r:id="rId4"/>
   </p:sldIdLst>
   <p:sldSz cx="12192000" cy="6858000"/>
   <p:notesSz cx="6858000" cy="9144000"/>
@@ -244,7 +245,7 @@
           <a:p>
             <a:fld id="{F82F713A-5EB9-4B7A-B87D-F2B7940161AF}" type="datetimeFigureOut">
               <a:rPr lang="en-NZ" smtClean="0"/>
-              <a:t>15/04/2020</a:t>
+              <a:t>2/06/2020</a:t>
             </a:fld>
             <a:endParaRPr lang="en-NZ"/>
           </a:p>
@@ -414,7 +415,7 @@
           <a:p>
             <a:fld id="{F82F713A-5EB9-4B7A-B87D-F2B7940161AF}" type="datetimeFigureOut">
               <a:rPr lang="en-NZ" smtClean="0"/>
-              <a:t>15/04/2020</a:t>
+              <a:t>2/06/2020</a:t>
             </a:fld>
             <a:endParaRPr lang="en-NZ"/>
           </a:p>
@@ -594,7 +595,7 @@
           <a:p>
             <a:fld id="{F82F713A-5EB9-4B7A-B87D-F2B7940161AF}" type="datetimeFigureOut">
               <a:rPr lang="en-NZ" smtClean="0"/>
-              <a:t>15/04/2020</a:t>
+              <a:t>2/06/2020</a:t>
             </a:fld>
             <a:endParaRPr lang="en-NZ"/>
           </a:p>
@@ -764,7 +765,7 @@
           <a:p>
             <a:fld id="{F82F713A-5EB9-4B7A-B87D-F2B7940161AF}" type="datetimeFigureOut">
               <a:rPr lang="en-NZ" smtClean="0"/>
-              <a:t>15/04/2020</a:t>
+              <a:t>2/06/2020</a:t>
             </a:fld>
             <a:endParaRPr lang="en-NZ"/>
           </a:p>
@@ -1010,7 +1011,7 @@
           <a:p>
             <a:fld id="{F82F713A-5EB9-4B7A-B87D-F2B7940161AF}" type="datetimeFigureOut">
               <a:rPr lang="en-NZ" smtClean="0"/>
-              <a:t>15/04/2020</a:t>
+              <a:t>2/06/2020</a:t>
             </a:fld>
             <a:endParaRPr lang="en-NZ"/>
           </a:p>
@@ -1242,7 +1243,7 @@
           <a:p>
             <a:fld id="{F82F713A-5EB9-4B7A-B87D-F2B7940161AF}" type="datetimeFigureOut">
               <a:rPr lang="en-NZ" smtClean="0"/>
-              <a:t>15/04/2020</a:t>
+              <a:t>2/06/2020</a:t>
             </a:fld>
             <a:endParaRPr lang="en-NZ"/>
           </a:p>
@@ -1609,7 +1610,7 @@
           <a:p>
             <a:fld id="{F82F713A-5EB9-4B7A-B87D-F2B7940161AF}" type="datetimeFigureOut">
               <a:rPr lang="en-NZ" smtClean="0"/>
-              <a:t>15/04/2020</a:t>
+              <a:t>2/06/2020</a:t>
             </a:fld>
             <a:endParaRPr lang="en-NZ"/>
           </a:p>
@@ -1727,7 +1728,7 @@
           <a:p>
             <a:fld id="{F82F713A-5EB9-4B7A-B87D-F2B7940161AF}" type="datetimeFigureOut">
               <a:rPr lang="en-NZ" smtClean="0"/>
-              <a:t>15/04/2020</a:t>
+              <a:t>2/06/2020</a:t>
             </a:fld>
             <a:endParaRPr lang="en-NZ"/>
           </a:p>
@@ -1822,7 +1823,7 @@
           <a:p>
             <a:fld id="{F82F713A-5EB9-4B7A-B87D-F2B7940161AF}" type="datetimeFigureOut">
               <a:rPr lang="en-NZ" smtClean="0"/>
-              <a:t>15/04/2020</a:t>
+              <a:t>2/06/2020</a:t>
             </a:fld>
             <a:endParaRPr lang="en-NZ"/>
           </a:p>
@@ -2099,7 +2100,7 @@
           <a:p>
             <a:fld id="{F82F713A-5EB9-4B7A-B87D-F2B7940161AF}" type="datetimeFigureOut">
               <a:rPr lang="en-NZ" smtClean="0"/>
-              <a:t>15/04/2020</a:t>
+              <a:t>2/06/2020</a:t>
             </a:fld>
             <a:endParaRPr lang="en-NZ"/>
           </a:p>
@@ -2356,7 +2357,7 @@
           <a:p>
             <a:fld id="{F82F713A-5EB9-4B7A-B87D-F2B7940161AF}" type="datetimeFigureOut">
               <a:rPr lang="en-NZ" smtClean="0"/>
-              <a:t>15/04/2020</a:t>
+              <a:t>2/06/2020</a:t>
             </a:fld>
             <a:endParaRPr lang="en-NZ"/>
           </a:p>
@@ -2569,7 +2570,7 @@
           <a:p>
             <a:fld id="{F82F713A-5EB9-4B7A-B87D-F2B7940161AF}" type="datetimeFigureOut">
               <a:rPr lang="en-NZ" smtClean="0"/>
-              <a:t>15/04/2020</a:t>
+              <a:t>2/06/2020</a:t>
             </a:fld>
             <a:endParaRPr lang="en-NZ"/>
           </a:p>
@@ -3265,6 +3266,30 @@
           <a:chExt cx="0" cy="0"/>
         </a:xfrm>
       </p:grpSpPr>
+      <p:pic>
+        <p:nvPicPr>
+          <p:cNvPr id="10" name="Picture 9"/>
+          <p:cNvPicPr>
+            <a:picLocks noChangeAspect="1"/>
+          </p:cNvPicPr>
+          <p:nvPr/>
+        </p:nvPicPr>
+        <p:blipFill>
+          <a:blip r:embed="rId3"/>
+          <a:stretch>
+            <a:fillRect/>
+          </a:stretch>
+        </p:blipFill>
+        <p:spPr>
+          <a:xfrm>
+            <a:off x="4677712" y="309826"/>
+            <a:ext cx="7108688" cy="4376128"/>
+          </a:xfrm>
+          <a:prstGeom prst="rect">
+            <a:avLst/>
+          </a:prstGeom>
+        </p:spPr>
+      </p:pic>
       <p:graphicFrame>
         <p:nvGraphicFramePr>
           <p:cNvPr id="2" name="Object 1"/>
@@ -3274,25 +3299,25 @@
           <p:nvPr>
             <p:extLst>
               <p:ext uri="{D42A27DB-BD31-4B8C-83A1-F6EECF244321}">
-                <p14:modId xmlns:p14="http://schemas.microsoft.com/office/powerpoint/2010/main" val="540428882"/>
+                <p14:modId xmlns:p14="http://schemas.microsoft.com/office/powerpoint/2010/main" val="1199198527"/>
               </p:ext>
             </p:extLst>
           </p:nvPr>
         </p:nvGraphicFramePr>
         <p:xfrm>
-          <a:off x="844457" y="957170"/>
+          <a:off x="609156" y="138082"/>
           <a:ext cx="3089275" cy="2860675"/>
         </p:xfrm>
         <a:graphic>
           <a:graphicData uri="http://schemas.openxmlformats.org/presentationml/2006/ole">
             <mc:AlternateContent xmlns:mc="http://schemas.openxmlformats.org/markup-compatibility/2006">
               <mc:Choice xmlns:v="urn:schemas-microsoft-com:vml" Requires="v">
-                <p:oleObj spid="_x0000_s1027" r:id="rId3" imgW="12317400" imgH="11491920" progId="">
+                <p:oleObj spid="_x0000_s1034" r:id="rId4" imgW="12317400" imgH="11491920" progId="">
                   <p:embed/>
                 </p:oleObj>
               </mc:Choice>
               <mc:Fallback>
-                <p:oleObj r:id="rId3" imgW="12317400" imgH="11491920" progId="">
+                <p:oleObj r:id="rId4" imgW="12317400" imgH="11491920" progId="">
                   <p:embed/>
                   <p:pic>
                     <p:nvPicPr>
@@ -3301,14 +3326,14 @@
                       <p:nvPr/>
                     </p:nvPicPr>
                     <p:blipFill>
-                      <a:blip r:embed="rId4"/>
+                      <a:blip r:embed="rId5"/>
                       <a:stretch>
                         <a:fillRect/>
                       </a:stretch>
                     </p:blipFill>
                     <p:spPr>
                       <a:xfrm>
-                        <a:off x="844457" y="957170"/>
+                        <a:off x="609156" y="138082"/>
                         <a:ext cx="3089275" cy="2860675"/>
                       </a:xfrm>
                       <a:prstGeom prst="rect">
@@ -3324,6 +3349,210 @@
       </p:graphicFrame>
       <p:pic>
         <p:nvPicPr>
+          <p:cNvPr id="4" name="Picture 3"/>
+          <p:cNvPicPr>
+            <a:picLocks noChangeAspect="1"/>
+          </p:cNvPicPr>
+          <p:nvPr/>
+        </p:nvPicPr>
+        <p:blipFill>
+          <a:blip r:embed="rId6"/>
+          <a:stretch>
+            <a:fillRect/>
+          </a:stretch>
+        </p:blipFill>
+        <p:spPr>
+          <a:xfrm>
+            <a:off x="472321" y="3545487"/>
+            <a:ext cx="3525677" cy="2408538"/>
+          </a:xfrm>
+          <a:prstGeom prst="rect">
+            <a:avLst/>
+          </a:prstGeom>
+        </p:spPr>
+      </p:pic>
+      <p:cxnSp>
+        <p:nvCxnSpPr>
+          <p:cNvPr id="6" name="Straight Connector 5"/>
+          <p:cNvCxnSpPr/>
+          <p:nvPr/>
+        </p:nvCxnSpPr>
+        <p:spPr>
+          <a:xfrm>
+            <a:off x="5119102" y="723710"/>
+            <a:ext cx="414895" cy="0"/>
+          </a:xfrm>
+          <a:prstGeom prst="line">
+            <a:avLst/>
+          </a:prstGeom>
+          <a:ln w="28575">
+            <a:solidFill>
+              <a:srgbClr val="C00000"/>
+            </a:solidFill>
+            <a:headEnd type="none" w="med" len="med"/>
+            <a:tailEnd type="arrow" w="med" len="med"/>
+          </a:ln>
+        </p:spPr>
+        <p:style>
+          <a:lnRef idx="1">
+            <a:schemeClr val="accent1"/>
+          </a:lnRef>
+          <a:fillRef idx="0">
+            <a:schemeClr val="accent1"/>
+          </a:fillRef>
+          <a:effectRef idx="0">
+            <a:schemeClr val="accent1"/>
+          </a:effectRef>
+          <a:fontRef idx="minor">
+            <a:schemeClr val="tx1"/>
+          </a:fontRef>
+        </p:style>
+      </p:cxnSp>
+      <p:cxnSp>
+        <p:nvCxnSpPr>
+          <p:cNvPr id="9" name="Straight Connector 8"/>
+          <p:cNvCxnSpPr/>
+          <p:nvPr/>
+        </p:nvCxnSpPr>
+        <p:spPr>
+          <a:xfrm flipH="1">
+            <a:off x="4839678" y="5240635"/>
+            <a:ext cx="414895" cy="0"/>
+          </a:xfrm>
+          <a:prstGeom prst="line">
+            <a:avLst/>
+          </a:prstGeom>
+          <a:ln w="28575">
+            <a:solidFill>
+              <a:srgbClr val="C00000"/>
+            </a:solidFill>
+            <a:headEnd type="none" w="med" len="med"/>
+            <a:tailEnd type="arrow" w="med" len="med"/>
+          </a:ln>
+        </p:spPr>
+        <p:style>
+          <a:lnRef idx="1">
+            <a:schemeClr val="accent1"/>
+          </a:lnRef>
+          <a:fillRef idx="0">
+            <a:schemeClr val="accent1"/>
+          </a:fillRef>
+          <a:effectRef idx="0">
+            <a:schemeClr val="accent1"/>
+          </a:effectRef>
+          <a:fontRef idx="minor">
+            <a:schemeClr val="tx1"/>
+          </a:fontRef>
+        </p:style>
+      </p:cxnSp>
+      <p:sp>
+        <p:nvSpPr>
+          <p:cNvPr id="7" name="TextBox 6"/>
+          <p:cNvSpPr txBox="1"/>
+          <p:nvPr/>
+        </p:nvSpPr>
+        <p:spPr>
+          <a:xfrm flipV="1">
+            <a:off x="4721675" y="2460806"/>
+            <a:ext cx="2899525" cy="1437994"/>
+          </a:xfrm>
+          <a:prstGeom prst="rect">
+            <a:avLst/>
+          </a:prstGeom>
+          <a:noFill/>
+          <a:ln w="19050">
+            <a:solidFill>
+              <a:srgbClr val="C00000"/>
+            </a:solidFill>
+            <a:prstDash val="sysDash"/>
+          </a:ln>
+          <a:effectLst>
+            <a:outerShdw blurRad="50800" dist="38100" dir="2700000" algn="tl" rotWithShape="0">
+              <a:prstClr val="black">
+                <a:alpha val="40000"/>
+              </a:prstClr>
+            </a:outerShdw>
+          </a:effectLst>
+        </p:spPr>
+        <p:txBody>
+          <a:bodyPr wrap="square" rtlCol="0">
+            <a:spAutoFit/>
+          </a:bodyPr>
+          <a:lstStyle/>
+          <a:p>
+            <a:endParaRPr lang="en-NZ" sz="1200" dirty="0"/>
+          </a:p>
+        </p:txBody>
+      </p:sp>
+      <p:cxnSp>
+        <p:nvCxnSpPr>
+          <p:cNvPr id="13" name="Straight Connector 12"/>
+          <p:cNvCxnSpPr/>
+          <p:nvPr/>
+        </p:nvCxnSpPr>
+        <p:spPr>
+          <a:xfrm>
+            <a:off x="8432302" y="723710"/>
+            <a:ext cx="414895" cy="0"/>
+          </a:xfrm>
+          <a:prstGeom prst="line">
+            <a:avLst/>
+          </a:prstGeom>
+          <a:ln w="28575">
+            <a:solidFill>
+              <a:srgbClr val="C00000"/>
+            </a:solidFill>
+            <a:headEnd type="none" w="med" len="med"/>
+            <a:tailEnd type="arrow" w="med" len="med"/>
+          </a:ln>
+        </p:spPr>
+        <p:style>
+          <a:lnRef idx="1">
+            <a:schemeClr val="accent1"/>
+          </a:lnRef>
+          <a:fillRef idx="0">
+            <a:schemeClr val="accent1"/>
+          </a:fillRef>
+          <a:effectRef idx="0">
+            <a:schemeClr val="accent1"/>
+          </a:effectRef>
+          <a:fontRef idx="minor">
+            <a:schemeClr val="tx1"/>
+          </a:fontRef>
+        </p:style>
+      </p:cxnSp>
+    </p:spTree>
+    <p:extLst>
+      <p:ext uri="{BB962C8B-B14F-4D97-AF65-F5344CB8AC3E}">
+        <p14:creationId xmlns:p14="http://schemas.microsoft.com/office/powerpoint/2010/main" val="489632905"/>
+      </p:ext>
+    </p:extLst>
+  </p:cSld>
+  <p:clrMapOvr>
+    <a:masterClrMapping/>
+  </p:clrMapOvr>
+</p:sld>
+</file>
+
+<file path=ppt/slides/slide3.xml><?xml version="1.0" encoding="utf-8"?>
+<p:sld xmlns:a="http://schemas.openxmlformats.org/drawingml/2006/main" xmlns:r="http://schemas.openxmlformats.org/officeDocument/2006/relationships" xmlns:p="http://schemas.openxmlformats.org/presentationml/2006/main">
+  <p:cSld>
+    <p:spTree>
+      <p:nvGrpSpPr>
+        <p:cNvPr id="1" name=""/>
+        <p:cNvGrpSpPr/>
+        <p:nvPr/>
+      </p:nvGrpSpPr>
+      <p:grpSpPr>
+        <a:xfrm>
+          <a:off x="0" y="0"/>
+          <a:ext cx="0" cy="0"/>
+          <a:chOff x="0" y="0"/>
+          <a:chExt cx="0" cy="0"/>
+        </a:xfrm>
+      </p:grpSpPr>
+      <p:pic>
+        <p:nvPicPr>
           <p:cNvPr id="3" name="Picture 2"/>
           <p:cNvPicPr>
             <a:picLocks noChangeAspect="1"/>
@@ -3331,15 +3560,15 @@
           <p:nvPr/>
         </p:nvPicPr>
         <p:blipFill>
-          <a:blip r:embed="rId5"/>
+          <a:blip r:embed="rId2"/>
           <a:stretch>
             <a:fillRect/>
           </a:stretch>
         </p:blipFill>
         <p:spPr>
           <a:xfrm>
-            <a:off x="4204449" y="997594"/>
-            <a:ext cx="2800052" cy="1898005"/>
+            <a:off x="1630200" y="1052737"/>
+            <a:ext cx="4251960" cy="3637598"/>
           </a:xfrm>
           <a:prstGeom prst="rect">
             <a:avLst/>
@@ -3349,7 +3578,7 @@
     </p:spTree>
     <p:extLst>
       <p:ext uri="{BB962C8B-B14F-4D97-AF65-F5344CB8AC3E}">
-        <p14:creationId xmlns:p14="http://schemas.microsoft.com/office/powerpoint/2010/main" val="489632905"/>
+        <p14:creationId xmlns:p14="http://schemas.microsoft.com/office/powerpoint/2010/main" val="427333399"/>
       </p:ext>
     </p:extLst>
   </p:cSld>

</xml_diff>

<commit_message>
Minor changes to survey
</commit_message>
<xml_diff>
--- a/iNZight/img/user_guides/dataset/Pictures _datasets.pptx
+++ b/iNZight/img/user_guides/dataset/Pictures _datasets.pptx
@@ -7,7 +7,8 @@
   <p:sldIdLst>
     <p:sldId id="260" r:id="rId2"/>
     <p:sldId id="261" r:id="rId3"/>
-    <p:sldId id="262" r:id="rId4"/>
+    <p:sldId id="263" r:id="rId4"/>
+    <p:sldId id="262" r:id="rId5"/>
   </p:sldIdLst>
   <p:sldSz cx="12192000" cy="6858000"/>
   <p:notesSz cx="6858000" cy="9144000"/>
@@ -245,7 +246,7 @@
           <a:p>
             <a:fld id="{F82F713A-5EB9-4B7A-B87D-F2B7940161AF}" type="datetimeFigureOut">
               <a:rPr lang="en-NZ" smtClean="0"/>
-              <a:t>2/06/2020</a:t>
+              <a:t>4/06/2020</a:t>
             </a:fld>
             <a:endParaRPr lang="en-NZ"/>
           </a:p>
@@ -415,7 +416,7 @@
           <a:p>
             <a:fld id="{F82F713A-5EB9-4B7A-B87D-F2B7940161AF}" type="datetimeFigureOut">
               <a:rPr lang="en-NZ" smtClean="0"/>
-              <a:t>2/06/2020</a:t>
+              <a:t>4/06/2020</a:t>
             </a:fld>
             <a:endParaRPr lang="en-NZ"/>
           </a:p>
@@ -595,7 +596,7 @@
           <a:p>
             <a:fld id="{F82F713A-5EB9-4B7A-B87D-F2B7940161AF}" type="datetimeFigureOut">
               <a:rPr lang="en-NZ" smtClean="0"/>
-              <a:t>2/06/2020</a:t>
+              <a:t>4/06/2020</a:t>
             </a:fld>
             <a:endParaRPr lang="en-NZ"/>
           </a:p>
@@ -765,7 +766,7 @@
           <a:p>
             <a:fld id="{F82F713A-5EB9-4B7A-B87D-F2B7940161AF}" type="datetimeFigureOut">
               <a:rPr lang="en-NZ" smtClean="0"/>
-              <a:t>2/06/2020</a:t>
+              <a:t>4/06/2020</a:t>
             </a:fld>
             <a:endParaRPr lang="en-NZ"/>
           </a:p>
@@ -1011,7 +1012,7 @@
           <a:p>
             <a:fld id="{F82F713A-5EB9-4B7A-B87D-F2B7940161AF}" type="datetimeFigureOut">
               <a:rPr lang="en-NZ" smtClean="0"/>
-              <a:t>2/06/2020</a:t>
+              <a:t>4/06/2020</a:t>
             </a:fld>
             <a:endParaRPr lang="en-NZ"/>
           </a:p>
@@ -1243,7 +1244,7 @@
           <a:p>
             <a:fld id="{F82F713A-5EB9-4B7A-B87D-F2B7940161AF}" type="datetimeFigureOut">
               <a:rPr lang="en-NZ" smtClean="0"/>
-              <a:t>2/06/2020</a:t>
+              <a:t>4/06/2020</a:t>
             </a:fld>
             <a:endParaRPr lang="en-NZ"/>
           </a:p>
@@ -1610,7 +1611,7 @@
           <a:p>
             <a:fld id="{F82F713A-5EB9-4B7A-B87D-F2B7940161AF}" type="datetimeFigureOut">
               <a:rPr lang="en-NZ" smtClean="0"/>
-              <a:t>2/06/2020</a:t>
+              <a:t>4/06/2020</a:t>
             </a:fld>
             <a:endParaRPr lang="en-NZ"/>
           </a:p>
@@ -1728,7 +1729,7 @@
           <a:p>
             <a:fld id="{F82F713A-5EB9-4B7A-B87D-F2B7940161AF}" type="datetimeFigureOut">
               <a:rPr lang="en-NZ" smtClean="0"/>
-              <a:t>2/06/2020</a:t>
+              <a:t>4/06/2020</a:t>
             </a:fld>
             <a:endParaRPr lang="en-NZ"/>
           </a:p>
@@ -1823,7 +1824,7 @@
           <a:p>
             <a:fld id="{F82F713A-5EB9-4B7A-B87D-F2B7940161AF}" type="datetimeFigureOut">
               <a:rPr lang="en-NZ" smtClean="0"/>
-              <a:t>2/06/2020</a:t>
+              <a:t>4/06/2020</a:t>
             </a:fld>
             <a:endParaRPr lang="en-NZ"/>
           </a:p>
@@ -2100,7 +2101,7 @@
           <a:p>
             <a:fld id="{F82F713A-5EB9-4B7A-B87D-F2B7940161AF}" type="datetimeFigureOut">
               <a:rPr lang="en-NZ" smtClean="0"/>
-              <a:t>2/06/2020</a:t>
+              <a:t>4/06/2020</a:t>
             </a:fld>
             <a:endParaRPr lang="en-NZ"/>
           </a:p>
@@ -2357,7 +2358,7 @@
           <a:p>
             <a:fld id="{F82F713A-5EB9-4B7A-B87D-F2B7940161AF}" type="datetimeFigureOut">
               <a:rPr lang="en-NZ" smtClean="0"/>
-              <a:t>2/06/2020</a:t>
+              <a:t>4/06/2020</a:t>
             </a:fld>
             <a:endParaRPr lang="en-NZ"/>
           </a:p>
@@ -2570,7 +2571,7 @@
           <a:p>
             <a:fld id="{F82F713A-5EB9-4B7A-B87D-F2B7940161AF}" type="datetimeFigureOut">
               <a:rPr lang="en-NZ" smtClean="0"/>
-              <a:t>2/06/2020</a:t>
+              <a:t>4/06/2020</a:t>
             </a:fld>
             <a:endParaRPr lang="en-NZ"/>
           </a:p>
@@ -3268,7 +3269,7 @@
       </p:grpSpPr>
       <p:pic>
         <p:nvPicPr>
-          <p:cNvPr id="10" name="Picture 9"/>
+          <p:cNvPr id="14" name="Picture 13"/>
           <p:cNvPicPr>
             <a:picLocks noChangeAspect="1"/>
           </p:cNvPicPr>
@@ -3282,12 +3283,46 @@
         </p:blipFill>
         <p:spPr>
           <a:xfrm>
-            <a:off x="4677712" y="309826"/>
-            <a:ext cx="7108688" cy="4376128"/>
+            <a:off x="7827874" y="138082"/>
+            <a:ext cx="2423160" cy="1597343"/>
           </a:xfrm>
           <a:prstGeom prst="rect">
             <a:avLst/>
           </a:prstGeom>
+          <a:ln>
+            <a:solidFill>
+              <a:srgbClr val="C00000"/>
+            </a:solidFill>
+          </a:ln>
+        </p:spPr>
+      </p:pic>
+      <p:pic>
+        <p:nvPicPr>
+          <p:cNvPr id="5" name="Picture 4"/>
+          <p:cNvPicPr>
+            <a:picLocks noChangeAspect="1"/>
+          </p:cNvPicPr>
+          <p:nvPr/>
+        </p:nvPicPr>
+        <p:blipFill>
+          <a:blip r:embed="rId4"/>
+          <a:stretch>
+            <a:fillRect/>
+          </a:stretch>
+        </p:blipFill>
+        <p:spPr>
+          <a:xfrm>
+            <a:off x="4240512" y="138082"/>
+            <a:ext cx="2957513" cy="3086100"/>
+          </a:xfrm>
+          <a:prstGeom prst="rect">
+            <a:avLst/>
+          </a:prstGeom>
+          <a:ln>
+            <a:solidFill>
+              <a:srgbClr val="C00000"/>
+            </a:solidFill>
+          </a:ln>
         </p:spPr>
       </p:pic>
       <p:graphicFrame>
@@ -3312,12 +3347,12 @@
           <a:graphicData uri="http://schemas.openxmlformats.org/presentationml/2006/ole">
             <mc:AlternateContent xmlns:mc="http://schemas.openxmlformats.org/markup-compatibility/2006">
               <mc:Choice xmlns:v="urn:schemas-microsoft-com:vml" Requires="v">
-                <p:oleObj spid="_x0000_s1034" r:id="rId4" imgW="12317400" imgH="11491920" progId="">
+                <p:oleObj spid="_x0000_s1041" r:id="rId5" imgW="12317400" imgH="11491920" progId="">
                   <p:embed/>
                 </p:oleObj>
               </mc:Choice>
               <mc:Fallback>
-                <p:oleObj r:id="rId4" imgW="12317400" imgH="11491920" progId="">
+                <p:oleObj r:id="rId5" imgW="12317400" imgH="11491920" progId="">
                   <p:embed/>
                   <p:pic>
                     <p:nvPicPr>
@@ -3326,7 +3361,7 @@
                       <p:nvPr/>
                     </p:nvPicPr>
                     <p:blipFill>
-                      <a:blip r:embed="rId5"/>
+                      <a:blip r:embed="rId6"/>
                       <a:stretch>
                         <a:fillRect/>
                       </a:stretch>
@@ -3356,7 +3391,7 @@
           <p:nvPr/>
         </p:nvPicPr>
         <p:blipFill>
-          <a:blip r:embed="rId6"/>
+          <a:blip r:embed="rId7"/>
           <a:stretch>
             <a:fillRect/>
           </a:stretch>
@@ -3379,7 +3414,7 @@
         </p:nvCxnSpPr>
         <p:spPr>
           <a:xfrm>
-            <a:off x="5119102" y="723710"/>
+            <a:off x="5648302" y="2891913"/>
             <a:ext cx="414895" cy="0"/>
           </a:xfrm>
           <a:prstGeom prst="line">
@@ -3416,8 +3451,8 @@
         </p:nvCxnSpPr>
         <p:spPr>
           <a:xfrm flipH="1">
-            <a:off x="4839678" y="5240635"/>
-            <a:ext cx="414895" cy="0"/>
+            <a:off x="9191234" y="1222085"/>
+            <a:ext cx="391966" cy="253916"/>
           </a:xfrm>
           <a:prstGeom prst="line">
             <a:avLst/>
@@ -3453,8 +3488,8 @@
         </p:nvSpPr>
         <p:spPr>
           <a:xfrm flipV="1">
-            <a:off x="4721675" y="2460806"/>
-            <a:ext cx="2899525" cy="1437994"/>
+            <a:off x="6001200" y="609028"/>
+            <a:ext cx="696250" cy="186572"/>
           </a:xfrm>
           <a:prstGeom prst="rect">
             <a:avLst/>
@@ -3491,9 +3526,9 @@
           <p:nvPr/>
         </p:nvCxnSpPr>
         <p:spPr>
-          <a:xfrm>
-            <a:off x="8432302" y="723710"/>
-            <a:ext cx="414895" cy="0"/>
+          <a:xfrm flipV="1">
+            <a:off x="7232143" y="1476001"/>
+            <a:ext cx="594315" cy="705599"/>
           </a:xfrm>
           <a:prstGeom prst="line">
             <a:avLst/>
@@ -3521,6 +3556,295 @@
           </a:fontRef>
         </p:style>
       </p:cxnSp>
+      <p:sp>
+        <p:nvSpPr>
+          <p:cNvPr id="12" name="TextBox 11"/>
+          <p:cNvSpPr txBox="1"/>
+          <p:nvPr/>
+        </p:nvSpPr>
+        <p:spPr>
+          <a:xfrm flipV="1">
+            <a:off x="6063197" y="2783385"/>
+            <a:ext cx="696250" cy="186572"/>
+          </a:xfrm>
+          <a:prstGeom prst="rect">
+            <a:avLst/>
+          </a:prstGeom>
+          <a:noFill/>
+          <a:ln w="19050">
+            <a:solidFill>
+              <a:srgbClr val="C00000"/>
+            </a:solidFill>
+            <a:prstDash val="sysDash"/>
+          </a:ln>
+          <a:effectLst>
+            <a:outerShdw blurRad="50800" dist="38100" dir="2700000" algn="tl" rotWithShape="0">
+              <a:prstClr val="black">
+                <a:alpha val="40000"/>
+              </a:prstClr>
+            </a:outerShdw>
+          </a:effectLst>
+        </p:spPr>
+        <p:txBody>
+          <a:bodyPr wrap="square" rtlCol="0">
+            <a:spAutoFit/>
+          </a:bodyPr>
+          <a:lstStyle/>
+          <a:p>
+            <a:endParaRPr lang="en-NZ" sz="1200" dirty="0"/>
+          </a:p>
+        </p:txBody>
+      </p:sp>
+      <p:graphicFrame>
+        <p:nvGraphicFramePr>
+          <p:cNvPr id="8" name="Object 7"/>
+          <p:cNvGraphicFramePr>
+            <a:graphicFrameLocks noChangeAspect="1"/>
+          </p:cNvGraphicFramePr>
+          <p:nvPr>
+            <p:extLst>
+              <p:ext uri="{D42A27DB-BD31-4B8C-83A1-F6EECF244321}">
+                <p14:modId xmlns:p14="http://schemas.microsoft.com/office/powerpoint/2010/main" val="4000694049"/>
+              </p:ext>
+            </p:extLst>
+          </p:nvPr>
+        </p:nvGraphicFramePr>
+        <p:xfrm>
+          <a:off x="7885882" y="2181600"/>
+          <a:ext cx="2145980" cy="2151504"/>
+        </p:xfrm>
+        <a:graphic>
+          <a:graphicData uri="http://schemas.openxmlformats.org/presentationml/2006/ole">
+            <mc:AlternateContent xmlns:mc="http://schemas.openxmlformats.org/markup-compatibility/2006">
+              <mc:Choice xmlns:v="urn:schemas-microsoft-com:vml" Requires="v">
+                <p:oleObj spid="_x0000_s1042" r:id="rId8" imgW="9828360" imgH="9929880" progId="">
+                  <p:embed/>
+                </p:oleObj>
+              </mc:Choice>
+              <mc:Fallback>
+                <p:oleObj r:id="rId8" imgW="9828360" imgH="9929880" progId="">
+                  <p:embed/>
+                  <p:pic>
+                    <p:nvPicPr>
+                      <p:cNvPr id="0" name=""/>
+                      <p:cNvPicPr/>
+                      <p:nvPr/>
+                    </p:nvPicPr>
+                    <p:blipFill>
+                      <a:blip r:embed="rId9"/>
+                      <a:stretch>
+                        <a:fillRect/>
+                      </a:stretch>
+                    </p:blipFill>
+                    <p:spPr>
+                      <a:xfrm>
+                        <a:off x="7885882" y="2181600"/>
+                        <a:ext cx="2145980" cy="2151504"/>
+                      </a:xfrm>
+                      <a:prstGeom prst="rect">
+                        <a:avLst/>
+                      </a:prstGeom>
+                      <a:ln>
+                        <a:solidFill>
+                          <a:srgbClr val="C00000"/>
+                        </a:solidFill>
+                      </a:ln>
+                    </p:spPr>
+                  </p:pic>
+                </p:oleObj>
+              </mc:Fallback>
+            </mc:AlternateContent>
+          </a:graphicData>
+        </a:graphic>
+      </p:graphicFrame>
+      <p:sp>
+        <p:nvSpPr>
+          <p:cNvPr id="16" name="TextBox 15"/>
+          <p:cNvSpPr txBox="1"/>
+          <p:nvPr/>
+        </p:nvSpPr>
+        <p:spPr>
+          <a:xfrm>
+            <a:off x="9535643" y="968169"/>
+            <a:ext cx="1345240" cy="253916"/>
+          </a:xfrm>
+          <a:prstGeom prst="rect">
+            <a:avLst/>
+          </a:prstGeom>
+          <a:noFill/>
+        </p:spPr>
+        <p:txBody>
+          <a:bodyPr wrap="none" rtlCol="0">
+            <a:spAutoFit/>
+          </a:bodyPr>
+          <a:lstStyle/>
+          <a:p>
+            <a:r>
+              <a:rPr lang="en-NZ" sz="1050" b="1" dirty="0" smtClean="0">
+                <a:solidFill>
+                  <a:srgbClr val="C00000"/>
+                </a:solidFill>
+              </a:rPr>
+              <a:t>Click to expand</a:t>
+            </a:r>
+            <a:endParaRPr lang="en-NZ" sz="1050" b="1" dirty="0">
+              <a:solidFill>
+                <a:srgbClr val="C00000"/>
+              </a:solidFill>
+            </a:endParaRPr>
+          </a:p>
+        </p:txBody>
+      </p:sp>
+      <p:cxnSp>
+        <p:nvCxnSpPr>
+          <p:cNvPr id="20" name="Straight Connector 19"/>
+          <p:cNvCxnSpPr/>
+          <p:nvPr/>
+        </p:nvCxnSpPr>
+        <p:spPr>
+          <a:xfrm flipH="1">
+            <a:off x="9191234" y="1618669"/>
+            <a:ext cx="21221" cy="1750931"/>
+          </a:xfrm>
+          <a:prstGeom prst="line">
+            <a:avLst/>
+          </a:prstGeom>
+          <a:ln w="28575">
+            <a:solidFill>
+              <a:srgbClr val="C00000"/>
+            </a:solidFill>
+            <a:headEnd type="none" w="med" len="med"/>
+            <a:tailEnd type="arrow" w="med" len="med"/>
+          </a:ln>
+        </p:spPr>
+        <p:style>
+          <a:lnRef idx="1">
+            <a:schemeClr val="accent1"/>
+          </a:lnRef>
+          <a:fillRef idx="0">
+            <a:schemeClr val="accent1"/>
+          </a:fillRef>
+          <a:effectRef idx="0">
+            <a:schemeClr val="accent1"/>
+          </a:effectRef>
+          <a:fontRef idx="minor">
+            <a:schemeClr val="tx1"/>
+          </a:fontRef>
+        </p:style>
+      </p:cxnSp>
+      <p:cxnSp>
+        <p:nvCxnSpPr>
+          <p:cNvPr id="25" name="Straight Connector 24"/>
+          <p:cNvCxnSpPr/>
+          <p:nvPr/>
+        </p:nvCxnSpPr>
+        <p:spPr>
+          <a:xfrm>
+            <a:off x="6321600" y="396000"/>
+            <a:ext cx="1173" cy="184801"/>
+          </a:xfrm>
+          <a:prstGeom prst="line">
+            <a:avLst/>
+          </a:prstGeom>
+          <a:ln w="28575">
+            <a:solidFill>
+              <a:srgbClr val="C00000"/>
+            </a:solidFill>
+            <a:headEnd type="none" w="med" len="med"/>
+            <a:tailEnd type="arrow" w="med" len="med"/>
+          </a:ln>
+        </p:spPr>
+        <p:style>
+          <a:lnRef idx="1">
+            <a:schemeClr val="accent1"/>
+          </a:lnRef>
+          <a:fillRef idx="0">
+            <a:schemeClr val="accent1"/>
+          </a:fillRef>
+          <a:effectRef idx="0">
+            <a:schemeClr val="accent1"/>
+          </a:effectRef>
+          <a:fontRef idx="minor">
+            <a:schemeClr val="tx1"/>
+          </a:fontRef>
+        </p:style>
+      </p:cxnSp>
+      <p:sp>
+        <p:nvSpPr>
+          <p:cNvPr id="26" name="TextBox 25"/>
+          <p:cNvSpPr txBox="1"/>
+          <p:nvPr/>
+        </p:nvSpPr>
+        <p:spPr>
+          <a:xfrm>
+            <a:off x="5879597" y="180556"/>
+            <a:ext cx="817853" cy="215444"/>
+          </a:xfrm>
+          <a:prstGeom prst="rect">
+            <a:avLst/>
+          </a:prstGeom>
+          <a:noFill/>
+        </p:spPr>
+        <p:txBody>
+          <a:bodyPr wrap="none" rtlCol="0">
+            <a:spAutoFit/>
+          </a:bodyPr>
+          <a:lstStyle/>
+          <a:p>
+            <a:r>
+              <a:rPr lang="en-NZ" sz="800" b="1" dirty="0" smtClean="0">
+                <a:solidFill>
+                  <a:srgbClr val="C00000"/>
+                </a:solidFill>
+              </a:rPr>
+              <a:t>drop-down</a:t>
+            </a:r>
+            <a:endParaRPr lang="en-NZ" sz="800" b="1" dirty="0">
+              <a:solidFill>
+                <a:srgbClr val="C00000"/>
+              </a:solidFill>
+            </a:endParaRPr>
+          </a:p>
+        </p:txBody>
+      </p:sp>
+      <p:sp>
+        <p:nvSpPr>
+          <p:cNvPr id="29" name="TextBox 28"/>
+          <p:cNvSpPr txBox="1"/>
+          <p:nvPr/>
+        </p:nvSpPr>
+        <p:spPr>
+          <a:xfrm>
+            <a:off x="5509264" y="2676740"/>
+            <a:ext cx="603050" cy="215444"/>
+          </a:xfrm>
+          <a:prstGeom prst="rect">
+            <a:avLst/>
+          </a:prstGeom>
+          <a:noFill/>
+        </p:spPr>
+        <p:txBody>
+          <a:bodyPr wrap="none" rtlCol="0">
+            <a:spAutoFit/>
+          </a:bodyPr>
+          <a:lstStyle/>
+          <a:p>
+            <a:r>
+              <a:rPr lang="en-NZ" sz="800" b="1" dirty="0" smtClean="0">
+                <a:solidFill>
+                  <a:srgbClr val="C00000"/>
+                </a:solidFill>
+              </a:rPr>
+              <a:t>Choose</a:t>
+            </a:r>
+            <a:endParaRPr lang="en-NZ" sz="800" b="1" dirty="0">
+              <a:solidFill>
+                <a:srgbClr val="C00000"/>
+              </a:solidFill>
+            </a:endParaRPr>
+          </a:p>
+        </p:txBody>
+      </p:sp>
     </p:spTree>
     <p:extLst>
       <p:ext uri="{BB962C8B-B14F-4D97-AF65-F5344CB8AC3E}">
@@ -3535,6 +3859,234 @@
 </file>
 
 <file path=ppt/slides/slide3.xml><?xml version="1.0" encoding="utf-8"?>
+<p:sld xmlns:a="http://schemas.openxmlformats.org/drawingml/2006/main" xmlns:r="http://schemas.openxmlformats.org/officeDocument/2006/relationships" xmlns:p="http://schemas.openxmlformats.org/presentationml/2006/main">
+  <p:cSld>
+    <p:spTree>
+      <p:nvGrpSpPr>
+        <p:cNvPr id="1" name=""/>
+        <p:cNvGrpSpPr/>
+        <p:nvPr/>
+      </p:nvGrpSpPr>
+      <p:grpSpPr>
+        <a:xfrm>
+          <a:off x="0" y="0"/>
+          <a:ext cx="0" cy="0"/>
+          <a:chOff x="0" y="0"/>
+          <a:chExt cx="0" cy="0"/>
+        </a:xfrm>
+      </p:grpSpPr>
+      <p:pic>
+        <p:nvPicPr>
+          <p:cNvPr id="10" name="Picture 9"/>
+          <p:cNvPicPr>
+            <a:picLocks noChangeAspect="1"/>
+          </p:cNvPicPr>
+          <p:nvPr/>
+        </p:nvPicPr>
+        <p:blipFill>
+          <a:blip r:embed="rId2"/>
+          <a:stretch>
+            <a:fillRect/>
+          </a:stretch>
+        </p:blipFill>
+        <p:spPr>
+          <a:xfrm>
+            <a:off x="4677712" y="309826"/>
+            <a:ext cx="7108688" cy="4376128"/>
+          </a:xfrm>
+          <a:prstGeom prst="rect">
+            <a:avLst/>
+          </a:prstGeom>
+        </p:spPr>
+      </p:pic>
+      <p:cxnSp>
+        <p:nvCxnSpPr>
+          <p:cNvPr id="6" name="Straight Connector 5"/>
+          <p:cNvCxnSpPr/>
+          <p:nvPr/>
+        </p:nvCxnSpPr>
+        <p:spPr>
+          <a:xfrm>
+            <a:off x="5119102" y="723710"/>
+            <a:ext cx="414895" cy="0"/>
+          </a:xfrm>
+          <a:prstGeom prst="line">
+            <a:avLst/>
+          </a:prstGeom>
+          <a:ln w="28575">
+            <a:solidFill>
+              <a:srgbClr val="C00000"/>
+            </a:solidFill>
+            <a:headEnd type="none" w="med" len="med"/>
+            <a:tailEnd type="arrow" w="med" len="med"/>
+          </a:ln>
+        </p:spPr>
+        <p:style>
+          <a:lnRef idx="1">
+            <a:schemeClr val="accent1"/>
+          </a:lnRef>
+          <a:fillRef idx="0">
+            <a:schemeClr val="accent1"/>
+          </a:fillRef>
+          <a:effectRef idx="0">
+            <a:schemeClr val="accent1"/>
+          </a:effectRef>
+          <a:fontRef idx="minor">
+            <a:schemeClr val="tx1"/>
+          </a:fontRef>
+        </p:style>
+      </p:cxnSp>
+      <p:cxnSp>
+        <p:nvCxnSpPr>
+          <p:cNvPr id="9" name="Straight Connector 8"/>
+          <p:cNvCxnSpPr/>
+          <p:nvPr/>
+        </p:nvCxnSpPr>
+        <p:spPr>
+          <a:xfrm flipH="1">
+            <a:off x="4839678" y="5240635"/>
+            <a:ext cx="414895" cy="0"/>
+          </a:xfrm>
+          <a:prstGeom prst="line">
+            <a:avLst/>
+          </a:prstGeom>
+          <a:ln w="28575">
+            <a:solidFill>
+              <a:srgbClr val="C00000"/>
+            </a:solidFill>
+            <a:headEnd type="none" w="med" len="med"/>
+            <a:tailEnd type="arrow" w="med" len="med"/>
+          </a:ln>
+        </p:spPr>
+        <p:style>
+          <a:lnRef idx="1">
+            <a:schemeClr val="accent1"/>
+          </a:lnRef>
+          <a:fillRef idx="0">
+            <a:schemeClr val="accent1"/>
+          </a:fillRef>
+          <a:effectRef idx="0">
+            <a:schemeClr val="accent1"/>
+          </a:effectRef>
+          <a:fontRef idx="minor">
+            <a:schemeClr val="tx1"/>
+          </a:fontRef>
+        </p:style>
+      </p:cxnSp>
+      <p:sp>
+        <p:nvSpPr>
+          <p:cNvPr id="7" name="TextBox 6"/>
+          <p:cNvSpPr txBox="1"/>
+          <p:nvPr/>
+        </p:nvSpPr>
+        <p:spPr>
+          <a:xfrm flipV="1">
+            <a:off x="4721675" y="2460806"/>
+            <a:ext cx="2899525" cy="1437994"/>
+          </a:xfrm>
+          <a:prstGeom prst="rect">
+            <a:avLst/>
+          </a:prstGeom>
+          <a:noFill/>
+          <a:ln w="19050">
+            <a:solidFill>
+              <a:srgbClr val="C00000"/>
+            </a:solidFill>
+            <a:prstDash val="sysDash"/>
+          </a:ln>
+          <a:effectLst>
+            <a:outerShdw blurRad="50800" dist="38100" dir="2700000" algn="tl" rotWithShape="0">
+              <a:prstClr val="black">
+                <a:alpha val="40000"/>
+              </a:prstClr>
+            </a:outerShdw>
+          </a:effectLst>
+        </p:spPr>
+        <p:txBody>
+          <a:bodyPr wrap="square" rtlCol="0">
+            <a:spAutoFit/>
+          </a:bodyPr>
+          <a:lstStyle/>
+          <a:p>
+            <a:endParaRPr lang="en-NZ" sz="1200" dirty="0"/>
+          </a:p>
+        </p:txBody>
+      </p:sp>
+      <p:cxnSp>
+        <p:nvCxnSpPr>
+          <p:cNvPr id="13" name="Straight Connector 12"/>
+          <p:cNvCxnSpPr/>
+          <p:nvPr/>
+        </p:nvCxnSpPr>
+        <p:spPr>
+          <a:xfrm>
+            <a:off x="8432302" y="723710"/>
+            <a:ext cx="414895" cy="0"/>
+          </a:xfrm>
+          <a:prstGeom prst="line">
+            <a:avLst/>
+          </a:prstGeom>
+          <a:ln w="28575">
+            <a:solidFill>
+              <a:srgbClr val="C00000"/>
+            </a:solidFill>
+            <a:headEnd type="none" w="med" len="med"/>
+            <a:tailEnd type="arrow" w="med" len="med"/>
+          </a:ln>
+        </p:spPr>
+        <p:style>
+          <a:lnRef idx="1">
+            <a:schemeClr val="accent1"/>
+          </a:lnRef>
+          <a:fillRef idx="0">
+            <a:schemeClr val="accent1"/>
+          </a:fillRef>
+          <a:effectRef idx="0">
+            <a:schemeClr val="accent1"/>
+          </a:effectRef>
+          <a:fontRef idx="minor">
+            <a:schemeClr val="tx1"/>
+          </a:fontRef>
+        </p:style>
+      </p:cxnSp>
+      <p:pic>
+        <p:nvPicPr>
+          <p:cNvPr id="3" name="Picture 2"/>
+          <p:cNvPicPr>
+            <a:picLocks noChangeAspect="1"/>
+          </p:cNvPicPr>
+          <p:nvPr/>
+        </p:nvPicPr>
+        <p:blipFill>
+          <a:blip r:embed="rId3"/>
+          <a:stretch>
+            <a:fillRect/>
+          </a:stretch>
+        </p:blipFill>
+        <p:spPr>
+          <a:xfrm>
+            <a:off x="9163050" y="1962376"/>
+            <a:ext cx="3028950" cy="3091815"/>
+          </a:xfrm>
+          <a:prstGeom prst="rect">
+            <a:avLst/>
+          </a:prstGeom>
+        </p:spPr>
+      </p:pic>
+    </p:spTree>
+    <p:extLst>
+      <p:ext uri="{BB962C8B-B14F-4D97-AF65-F5344CB8AC3E}">
+        <p14:creationId xmlns:p14="http://schemas.microsoft.com/office/powerpoint/2010/main" val="3733153933"/>
+      </p:ext>
+    </p:extLst>
+  </p:cSld>
+  <p:clrMapOvr>
+    <a:masterClrMapping/>
+  </p:clrMapOvr>
+</p:sld>
+</file>
+
+<file path=ppt/slides/slide4.xml><?xml version="1.0" encoding="utf-8"?>
 <p:sld xmlns:a="http://schemas.openxmlformats.org/drawingml/2006/main" xmlns:r="http://schemas.openxmlformats.org/officeDocument/2006/relationships" xmlns:p="http://schemas.openxmlformats.org/presentationml/2006/main">
   <p:cSld>
     <p:spTree>

</xml_diff>

<commit_message>
lite updates  of survey doc
</commit_message>
<xml_diff>
--- a/iNZight/img/user_guides/dataset/Pictures _datasets.pptx
+++ b/iNZight/img/user_guides/dataset/Pictures _datasets.pptx
@@ -5,10 +5,13 @@
     <p:sldMasterId id="2147483648" r:id="rId1"/>
   </p:sldMasterIdLst>
   <p:sldIdLst>
-    <p:sldId id="260" r:id="rId2"/>
-    <p:sldId id="261" r:id="rId3"/>
-    <p:sldId id="263" r:id="rId4"/>
-    <p:sldId id="262" r:id="rId5"/>
+    <p:sldId id="266" r:id="rId2"/>
+    <p:sldId id="260" r:id="rId3"/>
+    <p:sldId id="261" r:id="rId4"/>
+    <p:sldId id="264" r:id="rId5"/>
+    <p:sldId id="263" r:id="rId6"/>
+    <p:sldId id="262" r:id="rId7"/>
+    <p:sldId id="265" r:id="rId8"/>
   </p:sldIdLst>
   <p:sldSz cx="12192000" cy="6858000"/>
   <p:notesSz cx="6858000" cy="9144000"/>
@@ -246,7 +249,7 @@
           <a:p>
             <a:fld id="{F82F713A-5EB9-4B7A-B87D-F2B7940161AF}" type="datetimeFigureOut">
               <a:rPr lang="en-NZ" smtClean="0"/>
-              <a:t>4/06/2020</a:t>
+              <a:t>5/06/2020</a:t>
             </a:fld>
             <a:endParaRPr lang="en-NZ"/>
           </a:p>
@@ -416,7 +419,7 @@
           <a:p>
             <a:fld id="{F82F713A-5EB9-4B7A-B87D-F2B7940161AF}" type="datetimeFigureOut">
               <a:rPr lang="en-NZ" smtClean="0"/>
-              <a:t>4/06/2020</a:t>
+              <a:t>5/06/2020</a:t>
             </a:fld>
             <a:endParaRPr lang="en-NZ"/>
           </a:p>
@@ -596,7 +599,7 @@
           <a:p>
             <a:fld id="{F82F713A-5EB9-4B7A-B87D-F2B7940161AF}" type="datetimeFigureOut">
               <a:rPr lang="en-NZ" smtClean="0"/>
-              <a:t>4/06/2020</a:t>
+              <a:t>5/06/2020</a:t>
             </a:fld>
             <a:endParaRPr lang="en-NZ"/>
           </a:p>
@@ -766,7 +769,7 @@
           <a:p>
             <a:fld id="{F82F713A-5EB9-4B7A-B87D-F2B7940161AF}" type="datetimeFigureOut">
               <a:rPr lang="en-NZ" smtClean="0"/>
-              <a:t>4/06/2020</a:t>
+              <a:t>5/06/2020</a:t>
             </a:fld>
             <a:endParaRPr lang="en-NZ"/>
           </a:p>
@@ -1012,7 +1015,7 @@
           <a:p>
             <a:fld id="{F82F713A-5EB9-4B7A-B87D-F2B7940161AF}" type="datetimeFigureOut">
               <a:rPr lang="en-NZ" smtClean="0"/>
-              <a:t>4/06/2020</a:t>
+              <a:t>5/06/2020</a:t>
             </a:fld>
             <a:endParaRPr lang="en-NZ"/>
           </a:p>
@@ -1244,7 +1247,7 @@
           <a:p>
             <a:fld id="{F82F713A-5EB9-4B7A-B87D-F2B7940161AF}" type="datetimeFigureOut">
               <a:rPr lang="en-NZ" smtClean="0"/>
-              <a:t>4/06/2020</a:t>
+              <a:t>5/06/2020</a:t>
             </a:fld>
             <a:endParaRPr lang="en-NZ"/>
           </a:p>
@@ -1611,7 +1614,7 @@
           <a:p>
             <a:fld id="{F82F713A-5EB9-4B7A-B87D-F2B7940161AF}" type="datetimeFigureOut">
               <a:rPr lang="en-NZ" smtClean="0"/>
-              <a:t>4/06/2020</a:t>
+              <a:t>5/06/2020</a:t>
             </a:fld>
             <a:endParaRPr lang="en-NZ"/>
           </a:p>
@@ -1729,7 +1732,7 @@
           <a:p>
             <a:fld id="{F82F713A-5EB9-4B7A-B87D-F2B7940161AF}" type="datetimeFigureOut">
               <a:rPr lang="en-NZ" smtClean="0"/>
-              <a:t>4/06/2020</a:t>
+              <a:t>5/06/2020</a:t>
             </a:fld>
             <a:endParaRPr lang="en-NZ"/>
           </a:p>
@@ -1824,7 +1827,7 @@
           <a:p>
             <a:fld id="{F82F713A-5EB9-4B7A-B87D-F2B7940161AF}" type="datetimeFigureOut">
               <a:rPr lang="en-NZ" smtClean="0"/>
-              <a:t>4/06/2020</a:t>
+              <a:t>5/06/2020</a:t>
             </a:fld>
             <a:endParaRPr lang="en-NZ"/>
           </a:p>
@@ -2101,7 +2104,7 @@
           <a:p>
             <a:fld id="{F82F713A-5EB9-4B7A-B87D-F2B7940161AF}" type="datetimeFigureOut">
               <a:rPr lang="en-NZ" smtClean="0"/>
-              <a:t>4/06/2020</a:t>
+              <a:t>5/06/2020</a:t>
             </a:fld>
             <a:endParaRPr lang="en-NZ"/>
           </a:p>
@@ -2358,7 +2361,7 @@
           <a:p>
             <a:fld id="{F82F713A-5EB9-4B7A-B87D-F2B7940161AF}" type="datetimeFigureOut">
               <a:rPr lang="en-NZ" smtClean="0"/>
-              <a:t>4/06/2020</a:t>
+              <a:t>5/06/2020</a:t>
             </a:fld>
             <a:endParaRPr lang="en-NZ"/>
           </a:p>
@@ -2571,7 +2574,7 @@
           <a:p>
             <a:fld id="{F82F713A-5EB9-4B7A-B87D-F2B7940161AF}" type="datetimeFigureOut">
               <a:rPr lang="en-NZ" smtClean="0"/>
-              <a:t>4/06/2020</a:t>
+              <a:t>5/06/2020</a:t>
             </a:fld>
             <a:endParaRPr lang="en-NZ"/>
           </a:p>
@@ -2976,6 +2979,615 @@
           <a:chExt cx="0" cy="0"/>
         </a:xfrm>
       </p:grpSpPr>
+      <p:pic>
+        <p:nvPicPr>
+          <p:cNvPr id="4" name="Picture 3"/>
+          <p:cNvPicPr>
+            <a:picLocks noChangeAspect="1"/>
+          </p:cNvPicPr>
+          <p:nvPr/>
+        </p:nvPicPr>
+        <p:blipFill>
+          <a:blip r:embed="rId3"/>
+          <a:stretch>
+            <a:fillRect/>
+          </a:stretch>
+        </p:blipFill>
+        <p:spPr>
+          <a:xfrm>
+            <a:off x="436369" y="838537"/>
+            <a:ext cx="2263140" cy="2677478"/>
+          </a:xfrm>
+          <a:prstGeom prst="rect">
+            <a:avLst/>
+          </a:prstGeom>
+          <a:ln>
+            <a:solidFill>
+              <a:srgbClr val="C00000"/>
+            </a:solidFill>
+          </a:ln>
+        </p:spPr>
+      </p:pic>
+      <p:sp>
+        <p:nvSpPr>
+          <p:cNvPr id="5" name="Rectangle 4"/>
+          <p:cNvSpPr/>
+          <p:nvPr/>
+        </p:nvSpPr>
+        <p:spPr>
+          <a:xfrm>
+            <a:off x="436369" y="1172415"/>
+            <a:ext cx="1043231" cy="2229585"/>
+          </a:xfrm>
+          <a:prstGeom prst="rect">
+            <a:avLst/>
+          </a:prstGeom>
+          <a:solidFill>
+            <a:srgbClr val="FFFFFF">
+              <a:alpha val="92000"/>
+            </a:srgbClr>
+          </a:solidFill>
+          <a:ln>
+            <a:noFill/>
+          </a:ln>
+        </p:spPr>
+        <p:style>
+          <a:lnRef idx="2">
+            <a:schemeClr val="accent1">
+              <a:shade val="50000"/>
+            </a:schemeClr>
+          </a:lnRef>
+          <a:fillRef idx="1">
+            <a:schemeClr val="accent1"/>
+          </a:fillRef>
+          <a:effectRef idx="0">
+            <a:schemeClr val="accent1"/>
+          </a:effectRef>
+          <a:fontRef idx="minor">
+            <a:schemeClr val="lt1"/>
+          </a:fontRef>
+        </p:style>
+        <p:txBody>
+          <a:bodyPr rtlCol="0" anchor="ctr"/>
+          <a:lstStyle/>
+          <a:p>
+            <a:pPr algn="ctr"/>
+            <a:endParaRPr lang="en-NZ"/>
+          </a:p>
+        </p:txBody>
+      </p:sp>
+      <p:sp>
+        <p:nvSpPr>
+          <p:cNvPr id="6" name="TextBox 5"/>
+          <p:cNvSpPr txBox="1"/>
+          <p:nvPr/>
+        </p:nvSpPr>
+        <p:spPr>
+          <a:xfrm flipV="1">
+            <a:off x="1479600" y="890556"/>
+            <a:ext cx="684000" cy="167844"/>
+          </a:xfrm>
+          <a:prstGeom prst="rect">
+            <a:avLst/>
+          </a:prstGeom>
+          <a:noFill/>
+          <a:ln w="19050">
+            <a:solidFill>
+              <a:srgbClr val="C00000"/>
+            </a:solidFill>
+            <a:prstDash val="sysDash"/>
+          </a:ln>
+          <a:effectLst>
+            <a:outerShdw blurRad="50800" dist="38100" dir="2700000" algn="tl" rotWithShape="0">
+              <a:prstClr val="black">
+                <a:alpha val="40000"/>
+              </a:prstClr>
+            </a:outerShdw>
+          </a:effectLst>
+        </p:spPr>
+        <p:txBody>
+          <a:bodyPr wrap="square" rtlCol="0">
+            <a:spAutoFit/>
+          </a:bodyPr>
+          <a:lstStyle/>
+          <a:p>
+            <a:endParaRPr lang="en-NZ" sz="1200" dirty="0"/>
+          </a:p>
+        </p:txBody>
+      </p:sp>
+      <p:pic>
+        <p:nvPicPr>
+          <p:cNvPr id="8" name="Picture 7"/>
+          <p:cNvPicPr>
+            <a:picLocks noChangeAspect="1"/>
+          </p:cNvPicPr>
+          <p:nvPr/>
+        </p:nvPicPr>
+        <p:blipFill>
+          <a:blip r:embed="rId3"/>
+          <a:stretch>
+            <a:fillRect/>
+          </a:stretch>
+        </p:blipFill>
+        <p:spPr>
+          <a:xfrm>
+            <a:off x="3493969" y="838537"/>
+            <a:ext cx="2263140" cy="2677478"/>
+          </a:xfrm>
+          <a:prstGeom prst="rect">
+            <a:avLst/>
+          </a:prstGeom>
+          <a:ln>
+            <a:solidFill>
+              <a:srgbClr val="C00000"/>
+            </a:solidFill>
+          </a:ln>
+        </p:spPr>
+      </p:pic>
+      <p:sp>
+        <p:nvSpPr>
+          <p:cNvPr id="9" name="Rectangle 8"/>
+          <p:cNvSpPr/>
+          <p:nvPr/>
+        </p:nvSpPr>
+        <p:spPr>
+          <a:xfrm>
+            <a:off x="3493969" y="1172415"/>
+            <a:ext cx="1043231" cy="2229585"/>
+          </a:xfrm>
+          <a:prstGeom prst="rect">
+            <a:avLst/>
+          </a:prstGeom>
+          <a:solidFill>
+            <a:srgbClr val="FFFFFF">
+              <a:alpha val="92000"/>
+            </a:srgbClr>
+          </a:solidFill>
+          <a:ln>
+            <a:noFill/>
+          </a:ln>
+        </p:spPr>
+        <p:style>
+          <a:lnRef idx="2">
+            <a:schemeClr val="accent1">
+              <a:shade val="50000"/>
+            </a:schemeClr>
+          </a:lnRef>
+          <a:fillRef idx="1">
+            <a:schemeClr val="accent1"/>
+          </a:fillRef>
+          <a:effectRef idx="0">
+            <a:schemeClr val="accent1"/>
+          </a:effectRef>
+          <a:fontRef idx="minor">
+            <a:schemeClr val="lt1"/>
+          </a:fontRef>
+        </p:style>
+        <p:txBody>
+          <a:bodyPr rtlCol="0" anchor="ctr"/>
+          <a:lstStyle/>
+          <a:p>
+            <a:pPr algn="ctr"/>
+            <a:endParaRPr lang="en-NZ"/>
+          </a:p>
+        </p:txBody>
+      </p:sp>
+      <p:sp>
+        <p:nvSpPr>
+          <p:cNvPr id="10" name="TextBox 9"/>
+          <p:cNvSpPr txBox="1"/>
+          <p:nvPr/>
+        </p:nvSpPr>
+        <p:spPr>
+          <a:xfrm flipV="1">
+            <a:off x="4537200" y="890556"/>
+            <a:ext cx="684000" cy="167844"/>
+          </a:xfrm>
+          <a:prstGeom prst="rect">
+            <a:avLst/>
+          </a:prstGeom>
+          <a:noFill/>
+          <a:ln w="19050">
+            <a:solidFill>
+              <a:srgbClr val="C00000"/>
+            </a:solidFill>
+            <a:prstDash val="sysDash"/>
+          </a:ln>
+          <a:effectLst>
+            <a:outerShdw blurRad="50800" dist="38100" dir="2700000" algn="tl" rotWithShape="0">
+              <a:prstClr val="black">
+                <a:alpha val="40000"/>
+              </a:prstClr>
+            </a:outerShdw>
+          </a:effectLst>
+        </p:spPr>
+        <p:txBody>
+          <a:bodyPr wrap="square" rtlCol="0">
+            <a:spAutoFit/>
+          </a:bodyPr>
+          <a:lstStyle/>
+          <a:p>
+            <a:endParaRPr lang="en-NZ" sz="1200" dirty="0"/>
+          </a:p>
+        </p:txBody>
+      </p:sp>
+      <p:sp>
+        <p:nvSpPr>
+          <p:cNvPr id="11" name="TextBox 10"/>
+          <p:cNvSpPr txBox="1"/>
+          <p:nvPr/>
+        </p:nvSpPr>
+        <p:spPr>
+          <a:xfrm flipV="1">
+            <a:off x="4625539" y="1197756"/>
+            <a:ext cx="684000" cy="167844"/>
+          </a:xfrm>
+          <a:prstGeom prst="rect">
+            <a:avLst/>
+          </a:prstGeom>
+          <a:noFill/>
+          <a:ln w="19050">
+            <a:solidFill>
+              <a:srgbClr val="C00000"/>
+            </a:solidFill>
+            <a:prstDash val="sysDash"/>
+          </a:ln>
+          <a:effectLst>
+            <a:outerShdw blurRad="50800" dist="38100" dir="2700000" algn="tl" rotWithShape="0">
+              <a:prstClr val="black">
+                <a:alpha val="40000"/>
+              </a:prstClr>
+            </a:outerShdw>
+          </a:effectLst>
+        </p:spPr>
+        <p:txBody>
+          <a:bodyPr wrap="square" rtlCol="0">
+            <a:spAutoFit/>
+          </a:bodyPr>
+          <a:lstStyle/>
+          <a:p>
+            <a:endParaRPr lang="en-NZ" sz="1200" dirty="0"/>
+          </a:p>
+        </p:txBody>
+      </p:sp>
+      <p:pic>
+        <p:nvPicPr>
+          <p:cNvPr id="12" name="Picture 11"/>
+          <p:cNvPicPr>
+            <a:picLocks noChangeAspect="1"/>
+          </p:cNvPicPr>
+          <p:nvPr/>
+        </p:nvPicPr>
+        <p:blipFill>
+          <a:blip r:embed="rId4"/>
+          <a:stretch>
+            <a:fillRect/>
+          </a:stretch>
+        </p:blipFill>
+        <p:spPr>
+          <a:xfrm>
+            <a:off x="6508589" y="2564958"/>
+            <a:ext cx="2591380" cy="1438242"/>
+          </a:xfrm>
+          <a:prstGeom prst="rect">
+            <a:avLst/>
+          </a:prstGeom>
+          <a:ln>
+            <a:solidFill>
+              <a:srgbClr val="C00000"/>
+            </a:solidFill>
+          </a:ln>
+        </p:spPr>
+      </p:pic>
+      <p:graphicFrame>
+        <p:nvGraphicFramePr>
+          <p:cNvPr id="13" name="Object 12"/>
+          <p:cNvGraphicFramePr>
+            <a:graphicFrameLocks noChangeAspect="1"/>
+          </p:cNvGraphicFramePr>
+          <p:nvPr>
+            <p:extLst>
+              <p:ext uri="{D42A27DB-BD31-4B8C-83A1-F6EECF244321}">
+                <p14:modId xmlns:p14="http://schemas.microsoft.com/office/powerpoint/2010/main" val="1469026658"/>
+              </p:ext>
+            </p:extLst>
+          </p:nvPr>
+        </p:nvGraphicFramePr>
+        <p:xfrm>
+          <a:off x="6508589" y="801036"/>
+          <a:ext cx="2696387" cy="1729440"/>
+        </p:xfrm>
+        <a:graphic>
+          <a:graphicData uri="http://schemas.openxmlformats.org/presentationml/2006/ole">
+            <mc:AlternateContent xmlns:mc="http://schemas.openxmlformats.org/markup-compatibility/2006">
+              <mc:Choice xmlns:v="urn:schemas-microsoft-com:vml" Requires="v">
+                <p:oleObj spid="_x0000_s2053" r:id="rId5" imgW="14184000" imgH="9168120" progId="">
+                  <p:embed/>
+                </p:oleObj>
+              </mc:Choice>
+              <mc:Fallback>
+                <p:oleObj r:id="rId5" imgW="14184000" imgH="9168120" progId="">
+                  <p:embed/>
+                  <p:pic>
+                    <p:nvPicPr>
+                      <p:cNvPr id="0" name=""/>
+                      <p:cNvPicPr/>
+                      <p:nvPr/>
+                    </p:nvPicPr>
+                    <p:blipFill>
+                      <a:blip r:embed="rId6"/>
+                      <a:stretch>
+                        <a:fillRect/>
+                      </a:stretch>
+                    </p:blipFill>
+                    <p:spPr>
+                      <a:xfrm>
+                        <a:off x="6508589" y="801036"/>
+                        <a:ext cx="2696387" cy="1729440"/>
+                      </a:xfrm>
+                      <a:prstGeom prst="rect">
+                        <a:avLst/>
+                      </a:prstGeom>
+                      <a:ln>
+                        <a:solidFill>
+                          <a:srgbClr val="C00000"/>
+                        </a:solidFill>
+                      </a:ln>
+                    </p:spPr>
+                  </p:pic>
+                </p:oleObj>
+              </mc:Fallback>
+            </mc:AlternateContent>
+          </a:graphicData>
+        </a:graphic>
+      </p:graphicFrame>
+      <p:sp>
+        <p:nvSpPr>
+          <p:cNvPr id="14" name="TextBox 13"/>
+          <p:cNvSpPr txBox="1"/>
+          <p:nvPr/>
+        </p:nvSpPr>
+        <p:spPr>
+          <a:xfrm>
+            <a:off x="7801476" y="2010882"/>
+            <a:ext cx="824265" cy="215444"/>
+          </a:xfrm>
+          <a:prstGeom prst="rect">
+            <a:avLst/>
+          </a:prstGeom>
+          <a:solidFill>
+            <a:schemeClr val="bg1"/>
+          </a:solidFill>
+        </p:spPr>
+        <p:txBody>
+          <a:bodyPr wrap="none" rtlCol="0">
+            <a:spAutoFit/>
+          </a:bodyPr>
+          <a:lstStyle/>
+          <a:p>
+            <a:r>
+              <a:rPr lang="en-NZ" sz="800" b="1" dirty="0" smtClean="0">
+                <a:solidFill>
+                  <a:srgbClr val="C00000"/>
+                </a:solidFill>
+              </a:rPr>
+              <a:t>Expands to</a:t>
+            </a:r>
+            <a:endParaRPr lang="en-NZ" sz="800" b="1" dirty="0">
+              <a:solidFill>
+                <a:srgbClr val="C00000"/>
+              </a:solidFill>
+            </a:endParaRPr>
+          </a:p>
+        </p:txBody>
+      </p:sp>
+      <p:cxnSp>
+        <p:nvCxnSpPr>
+          <p:cNvPr id="15" name="Straight Connector 14"/>
+          <p:cNvCxnSpPr/>
+          <p:nvPr/>
+        </p:nvCxnSpPr>
+        <p:spPr>
+          <a:xfrm flipV="1">
+            <a:off x="8220280" y="1717200"/>
+            <a:ext cx="592520" cy="259200"/>
+          </a:xfrm>
+          <a:prstGeom prst="line">
+            <a:avLst/>
+          </a:prstGeom>
+          <a:ln w="28575">
+            <a:solidFill>
+              <a:srgbClr val="C00000"/>
+            </a:solidFill>
+            <a:headEnd type="none" w="med" len="med"/>
+            <a:tailEnd type="arrow" w="med" len="med"/>
+          </a:ln>
+        </p:spPr>
+        <p:style>
+          <a:lnRef idx="1">
+            <a:schemeClr val="accent1"/>
+          </a:lnRef>
+          <a:fillRef idx="0">
+            <a:schemeClr val="accent1"/>
+          </a:fillRef>
+          <a:effectRef idx="0">
+            <a:schemeClr val="accent1"/>
+          </a:effectRef>
+          <a:fontRef idx="minor">
+            <a:schemeClr val="tx1"/>
+          </a:fontRef>
+        </p:style>
+      </p:cxnSp>
+      <p:sp>
+        <p:nvSpPr>
+          <p:cNvPr id="16" name="TextBox 15"/>
+          <p:cNvSpPr txBox="1"/>
+          <p:nvPr/>
+        </p:nvSpPr>
+        <p:spPr>
+          <a:xfrm>
+            <a:off x="5691221" y="1197756"/>
+            <a:ext cx="859531" cy="415498"/>
+          </a:xfrm>
+          <a:prstGeom prst="rect">
+            <a:avLst/>
+          </a:prstGeom>
+          <a:solidFill>
+            <a:schemeClr val="bg1"/>
+          </a:solidFill>
+        </p:spPr>
+        <p:txBody>
+          <a:bodyPr wrap="none" rtlCol="0">
+            <a:spAutoFit/>
+          </a:bodyPr>
+          <a:lstStyle/>
+          <a:p>
+            <a:pPr algn="ctr"/>
+            <a:r>
+              <a:rPr lang="en-NZ" sz="700" dirty="0" smtClean="0">
+                <a:solidFill>
+                  <a:srgbClr val="C00000"/>
+                </a:solidFill>
+              </a:rPr>
+              <a:t>(Left-hand)</a:t>
+            </a:r>
+          </a:p>
+          <a:p>
+            <a:pPr algn="ctr"/>
+            <a:r>
+              <a:rPr lang="en-NZ" sz="700" b="1" dirty="0" smtClean="0">
+                <a:solidFill>
+                  <a:srgbClr val="C00000"/>
+                </a:solidFill>
+              </a:rPr>
+              <a:t>C</a:t>
+            </a:r>
+            <a:r>
+              <a:rPr lang="en-NZ" sz="700" b="1" dirty="0" smtClean="0">
+                <a:solidFill>
+                  <a:srgbClr val="C00000"/>
+                </a:solidFill>
+              </a:rPr>
+              <a:t>ontrol panel</a:t>
+            </a:r>
+          </a:p>
+          <a:p>
+            <a:pPr algn="ctr"/>
+            <a:r>
+              <a:rPr lang="en-NZ" sz="700" b="1" dirty="0" smtClean="0">
+                <a:solidFill>
+                  <a:srgbClr val="C00000"/>
+                </a:solidFill>
+              </a:rPr>
+              <a:t>changes to </a:t>
+            </a:r>
+          </a:p>
+        </p:txBody>
+      </p:sp>
+      <p:cxnSp>
+        <p:nvCxnSpPr>
+          <p:cNvPr id="17" name="Straight Connector 16"/>
+          <p:cNvCxnSpPr/>
+          <p:nvPr/>
+        </p:nvCxnSpPr>
+        <p:spPr>
+          <a:xfrm>
+            <a:off x="5801776" y="1658556"/>
+            <a:ext cx="604800" cy="7200"/>
+          </a:xfrm>
+          <a:prstGeom prst="line">
+            <a:avLst/>
+          </a:prstGeom>
+          <a:ln w="28575">
+            <a:solidFill>
+              <a:srgbClr val="C00000"/>
+            </a:solidFill>
+            <a:headEnd type="none" w="med" len="med"/>
+            <a:tailEnd type="arrow" w="med" len="med"/>
+          </a:ln>
+        </p:spPr>
+        <p:style>
+          <a:lnRef idx="1">
+            <a:schemeClr val="accent1"/>
+          </a:lnRef>
+          <a:fillRef idx="0">
+            <a:schemeClr val="accent1"/>
+          </a:fillRef>
+          <a:effectRef idx="0">
+            <a:schemeClr val="accent1"/>
+          </a:effectRef>
+          <a:fontRef idx="minor">
+            <a:schemeClr val="tx1"/>
+          </a:fontRef>
+        </p:style>
+      </p:cxnSp>
+      <p:cxnSp>
+        <p:nvCxnSpPr>
+          <p:cNvPr id="24" name="Straight Connector 23"/>
+          <p:cNvCxnSpPr/>
+          <p:nvPr/>
+        </p:nvCxnSpPr>
+        <p:spPr>
+          <a:xfrm flipH="1">
+            <a:off x="7545876" y="2226326"/>
+            <a:ext cx="511199" cy="971992"/>
+          </a:xfrm>
+          <a:prstGeom prst="line">
+            <a:avLst/>
+          </a:prstGeom>
+          <a:ln w="28575">
+            <a:solidFill>
+              <a:srgbClr val="C00000"/>
+            </a:solidFill>
+            <a:headEnd type="none" w="med" len="med"/>
+            <a:tailEnd type="arrow" w="med" len="med"/>
+          </a:ln>
+        </p:spPr>
+        <p:style>
+          <a:lnRef idx="1">
+            <a:schemeClr val="accent1"/>
+          </a:lnRef>
+          <a:fillRef idx="0">
+            <a:schemeClr val="accent1"/>
+          </a:fillRef>
+          <a:effectRef idx="0">
+            <a:schemeClr val="accent1"/>
+          </a:effectRef>
+          <a:fontRef idx="minor">
+            <a:schemeClr val="tx1"/>
+          </a:fontRef>
+        </p:style>
+      </p:cxnSp>
+    </p:spTree>
+    <p:extLst>
+      <p:ext uri="{BB962C8B-B14F-4D97-AF65-F5344CB8AC3E}">
+        <p14:creationId xmlns:p14="http://schemas.microsoft.com/office/powerpoint/2010/main" val="2356659147"/>
+      </p:ext>
+    </p:extLst>
+  </p:cSld>
+  <p:clrMapOvr>
+    <a:masterClrMapping/>
+  </p:clrMapOvr>
+</p:sld>
+</file>
+
+<file path=ppt/slides/slide2.xml><?xml version="1.0" encoding="utf-8"?>
+<p:sld xmlns:a="http://schemas.openxmlformats.org/drawingml/2006/main" xmlns:r="http://schemas.openxmlformats.org/officeDocument/2006/relationships" xmlns:p="http://schemas.openxmlformats.org/presentationml/2006/main">
+  <p:cSld>
+    <p:spTree>
+      <p:nvGrpSpPr>
+        <p:cNvPr id="1" name=""/>
+        <p:cNvGrpSpPr/>
+        <p:nvPr/>
+      </p:nvGrpSpPr>
+      <p:grpSpPr>
+        <a:xfrm>
+          <a:off x="0" y="0"/>
+          <a:ext cx="0" cy="0"/>
+          <a:chOff x="0" y="0"/>
+          <a:chExt cx="0" cy="0"/>
+        </a:xfrm>
+      </p:grpSpPr>
       <p:grpSp>
         <p:nvGrpSpPr>
           <p:cNvPr id="16" name="Group 15"/>
@@ -3250,7 +3862,7 @@
 </p:sld>
 </file>
 
-<file path=ppt/slides/slide2.xml><?xml version="1.0" encoding="utf-8"?>
+<file path=ppt/slides/slide3.xml><?xml version="1.0" encoding="utf-8"?>
 <p:sld xmlns:a="http://schemas.openxmlformats.org/drawingml/2006/main" xmlns:r="http://schemas.openxmlformats.org/officeDocument/2006/relationships" xmlns:p="http://schemas.openxmlformats.org/presentationml/2006/main">
   <p:cSld>
     <p:spTree>
@@ -3347,7 +3959,7 @@
           <a:graphicData uri="http://schemas.openxmlformats.org/presentationml/2006/ole">
             <mc:AlternateContent xmlns:mc="http://schemas.openxmlformats.org/markup-compatibility/2006">
               <mc:Choice xmlns:v="urn:schemas-microsoft-com:vml" Requires="v">
-                <p:oleObj spid="_x0000_s1041" r:id="rId5" imgW="12317400" imgH="11491920" progId="">
+                <p:oleObj spid="_x0000_s1061" r:id="rId5" imgW="12317400" imgH="11491920" progId="">
                   <p:embed/>
                 </p:oleObj>
               </mc:Choice>
@@ -3382,30 +3994,6 @@
           </a:graphicData>
         </a:graphic>
       </p:graphicFrame>
-      <p:pic>
-        <p:nvPicPr>
-          <p:cNvPr id="4" name="Picture 3"/>
-          <p:cNvPicPr>
-            <a:picLocks noChangeAspect="1"/>
-          </p:cNvPicPr>
-          <p:nvPr/>
-        </p:nvPicPr>
-        <p:blipFill>
-          <a:blip r:embed="rId7"/>
-          <a:stretch>
-            <a:fillRect/>
-          </a:stretch>
-        </p:blipFill>
-        <p:spPr>
-          <a:xfrm>
-            <a:off x="472321" y="3545487"/>
-            <a:ext cx="3525677" cy="2408538"/>
-          </a:xfrm>
-          <a:prstGeom prst="rect">
-            <a:avLst/>
-          </a:prstGeom>
-        </p:spPr>
-      </p:pic>
       <p:cxnSp>
         <p:nvCxnSpPr>
           <p:cNvPr id="6" name="Straight Connector 5"/>
@@ -3617,12 +4205,12 @@
           <a:graphicData uri="http://schemas.openxmlformats.org/presentationml/2006/ole">
             <mc:AlternateContent xmlns:mc="http://schemas.openxmlformats.org/markup-compatibility/2006">
               <mc:Choice xmlns:v="urn:schemas-microsoft-com:vml" Requires="v">
-                <p:oleObj spid="_x0000_s1042" r:id="rId8" imgW="9828360" imgH="9929880" progId="">
+                <p:oleObj spid="_x0000_s1062" r:id="rId7" imgW="9828360" imgH="9929880" progId="">
                   <p:embed/>
                 </p:oleObj>
               </mc:Choice>
               <mc:Fallback>
-                <p:oleObj r:id="rId8" imgW="9828360" imgH="9929880" progId="">
+                <p:oleObj r:id="rId7" imgW="9828360" imgH="9929880" progId="">
                   <p:embed/>
                   <p:pic>
                     <p:nvPicPr>
@@ -3631,7 +4219,7 @@
                       <p:nvPr/>
                     </p:nvPicPr>
                     <p:blipFill>
-                      <a:blip r:embed="rId9"/>
+                      <a:blip r:embed="rId8"/>
                       <a:stretch>
                         <a:fillRect/>
                       </a:stretch>
@@ -3858,7 +4446,129 @@
 </p:sld>
 </file>
 
-<file path=ppt/slides/slide3.xml><?xml version="1.0" encoding="utf-8"?>
+<file path=ppt/slides/slide4.xml><?xml version="1.0" encoding="utf-8"?>
+<p:sld xmlns:a="http://schemas.openxmlformats.org/drawingml/2006/main" xmlns:r="http://schemas.openxmlformats.org/officeDocument/2006/relationships" xmlns:p="http://schemas.openxmlformats.org/presentationml/2006/main">
+  <p:cSld>
+    <p:spTree>
+      <p:nvGrpSpPr>
+        <p:cNvPr id="1" name=""/>
+        <p:cNvGrpSpPr/>
+        <p:nvPr/>
+      </p:nvGrpSpPr>
+      <p:grpSpPr>
+        <a:xfrm>
+          <a:off x="0" y="0"/>
+          <a:ext cx="0" cy="0"/>
+          <a:chOff x="0" y="0"/>
+          <a:chExt cx="0" cy="0"/>
+        </a:xfrm>
+      </p:grpSpPr>
+      <p:pic>
+        <p:nvPicPr>
+          <p:cNvPr id="2" name="Picture 1"/>
+          <p:cNvPicPr>
+            <a:picLocks noChangeAspect="1"/>
+          </p:cNvPicPr>
+          <p:nvPr/>
+        </p:nvPicPr>
+        <p:blipFill>
+          <a:blip r:embed="rId2"/>
+          <a:stretch>
+            <a:fillRect/>
+          </a:stretch>
+        </p:blipFill>
+        <p:spPr>
+          <a:xfrm>
+            <a:off x="5286900" y="247312"/>
+            <a:ext cx="2811780" cy="6272213"/>
+          </a:xfrm>
+          <a:prstGeom prst="rect">
+            <a:avLst/>
+          </a:prstGeom>
+          <a:ln>
+            <a:solidFill>
+              <a:srgbClr val="C00000"/>
+            </a:solidFill>
+          </a:ln>
+        </p:spPr>
+      </p:pic>
+      <p:pic>
+        <p:nvPicPr>
+          <p:cNvPr id="3" name="Picture 2"/>
+          <p:cNvPicPr>
+            <a:picLocks noChangeAspect="1"/>
+          </p:cNvPicPr>
+          <p:nvPr/>
+        </p:nvPicPr>
+        <p:blipFill>
+          <a:blip r:embed="rId3"/>
+          <a:stretch>
+            <a:fillRect/>
+          </a:stretch>
+        </p:blipFill>
+        <p:spPr>
+          <a:xfrm>
+            <a:off x="702721" y="1817487"/>
+            <a:ext cx="3525677" cy="2408538"/>
+          </a:xfrm>
+          <a:prstGeom prst="rect">
+            <a:avLst/>
+          </a:prstGeom>
+        </p:spPr>
+      </p:pic>
+      <p:sp>
+        <p:nvSpPr>
+          <p:cNvPr id="4" name="TextBox 3"/>
+          <p:cNvSpPr txBox="1"/>
+          <p:nvPr/>
+        </p:nvSpPr>
+        <p:spPr>
+          <a:xfrm flipV="1">
+            <a:off x="5609597" y="1160556"/>
+            <a:ext cx="780404" cy="178644"/>
+          </a:xfrm>
+          <a:prstGeom prst="rect">
+            <a:avLst/>
+          </a:prstGeom>
+          <a:noFill/>
+          <a:ln w="19050">
+            <a:solidFill>
+              <a:srgbClr val="C00000"/>
+            </a:solidFill>
+            <a:prstDash val="sysDash"/>
+          </a:ln>
+          <a:effectLst>
+            <a:outerShdw blurRad="50800" dist="38100" dir="2700000" algn="tl" rotWithShape="0">
+              <a:prstClr val="black">
+                <a:alpha val="40000"/>
+              </a:prstClr>
+            </a:outerShdw>
+          </a:effectLst>
+        </p:spPr>
+        <p:txBody>
+          <a:bodyPr wrap="square" rtlCol="0">
+            <a:spAutoFit/>
+          </a:bodyPr>
+          <a:lstStyle/>
+          <a:p>
+            <a:endParaRPr lang="en-NZ" sz="1200" dirty="0"/>
+          </a:p>
+        </p:txBody>
+      </p:sp>
+    </p:spTree>
+    <p:extLst>
+      <p:ext uri="{BB962C8B-B14F-4D97-AF65-F5344CB8AC3E}">
+        <p14:creationId xmlns:p14="http://schemas.microsoft.com/office/powerpoint/2010/main" val="3134071684"/>
+      </p:ext>
+    </p:extLst>
+  </p:cSld>
+  <p:clrMapOvr>
+    <a:masterClrMapping/>
+  </p:clrMapOvr>
+</p:sld>
+</file>
+
+<file path=ppt/slides/slide5.xml><?xml version="1.0" encoding="utf-8"?>
 <p:sld xmlns:a="http://schemas.openxmlformats.org/drawingml/2006/main" xmlns:r="http://schemas.openxmlformats.org/officeDocument/2006/relationships" xmlns:p="http://schemas.openxmlformats.org/presentationml/2006/main">
   <p:cSld>
     <p:spTree>
@@ -3891,7 +4601,7 @@
         </p:blipFill>
         <p:spPr>
           <a:xfrm>
-            <a:off x="4677712" y="309826"/>
+            <a:off x="325312" y="583426"/>
             <a:ext cx="7108688" cy="4376128"/>
           </a:xfrm>
           <a:prstGeom prst="rect">
@@ -3907,7 +4617,7 @@
         </p:nvCxnSpPr>
         <p:spPr>
           <a:xfrm>
-            <a:off x="5119102" y="723710"/>
+            <a:off x="766702" y="997310"/>
             <a:ext cx="414895" cy="0"/>
           </a:xfrm>
           <a:prstGeom prst="line">
@@ -3944,7 +4654,7 @@
         </p:nvCxnSpPr>
         <p:spPr>
           <a:xfrm flipH="1">
-            <a:off x="4839678" y="5240635"/>
+            <a:off x="487278" y="5514235"/>
             <a:ext cx="414895" cy="0"/>
           </a:xfrm>
           <a:prstGeom prst="line">
@@ -3981,7 +4691,7 @@
         </p:nvSpPr>
         <p:spPr>
           <a:xfrm flipV="1">
-            <a:off x="4721675" y="2460806"/>
+            <a:off x="369275" y="2734406"/>
             <a:ext cx="2899525" cy="1437994"/>
           </a:xfrm>
           <a:prstGeom prst="rect">
@@ -4020,7 +4730,7 @@
         </p:nvCxnSpPr>
         <p:spPr>
           <a:xfrm>
-            <a:off x="8432302" y="723710"/>
+            <a:off x="4079902" y="997310"/>
             <a:ext cx="414895" cy="0"/>
           </a:xfrm>
           <a:prstGeom prst="line">
@@ -4051,7 +4761,7 @@
       </p:cxnSp>
       <p:pic>
         <p:nvPicPr>
-          <p:cNvPr id="3" name="Picture 2"/>
+          <p:cNvPr id="4" name="Picture 3"/>
           <p:cNvPicPr>
             <a:picLocks noChangeAspect="1"/>
           </p:cNvPicPr>
@@ -4065,14 +4775,58 @@
         </p:blipFill>
         <p:spPr>
           <a:xfrm>
-            <a:off x="9163050" y="1962376"/>
-            <a:ext cx="3028950" cy="3091815"/>
+            <a:off x="8199937" y="240226"/>
+            <a:ext cx="2951798" cy="5732145"/>
           </a:xfrm>
           <a:prstGeom prst="rect">
             <a:avLst/>
           </a:prstGeom>
+          <a:ln>
+            <a:solidFill>
+              <a:srgbClr val="C00000"/>
+            </a:solidFill>
+          </a:ln>
         </p:spPr>
       </p:pic>
+      <p:sp>
+        <p:nvSpPr>
+          <p:cNvPr id="15" name="TextBox 14"/>
+          <p:cNvSpPr txBox="1"/>
+          <p:nvPr/>
+        </p:nvSpPr>
+        <p:spPr>
+          <a:xfrm flipV="1">
+            <a:off x="8410396" y="627756"/>
+            <a:ext cx="1079203" cy="171444"/>
+          </a:xfrm>
+          <a:prstGeom prst="rect">
+            <a:avLst/>
+          </a:prstGeom>
+          <a:noFill/>
+          <a:ln w="19050">
+            <a:solidFill>
+              <a:srgbClr val="C00000"/>
+            </a:solidFill>
+            <a:prstDash val="sysDash"/>
+          </a:ln>
+          <a:effectLst>
+            <a:outerShdw blurRad="50800" dist="38100" dir="2700000" algn="tl" rotWithShape="0">
+              <a:prstClr val="black">
+                <a:alpha val="40000"/>
+              </a:prstClr>
+            </a:outerShdw>
+          </a:effectLst>
+        </p:spPr>
+        <p:txBody>
+          <a:bodyPr wrap="square" rtlCol="0">
+            <a:spAutoFit/>
+          </a:bodyPr>
+          <a:lstStyle/>
+          <a:p>
+            <a:endParaRPr lang="en-NZ" sz="1200" dirty="0"/>
+          </a:p>
+        </p:txBody>
+      </p:sp>
     </p:spTree>
     <p:extLst>
       <p:ext uri="{BB962C8B-B14F-4D97-AF65-F5344CB8AC3E}">
@@ -4086,7 +4840,7 @@
 </p:sld>
 </file>
 
-<file path=ppt/slides/slide4.xml><?xml version="1.0" encoding="utf-8"?>
+<file path=ppt/slides/slide6.xml><?xml version="1.0" encoding="utf-8"?>
 <p:sld xmlns:a="http://schemas.openxmlformats.org/drawingml/2006/main" xmlns:r="http://schemas.openxmlformats.org/officeDocument/2006/relationships" xmlns:p="http://schemas.openxmlformats.org/presentationml/2006/main">
   <p:cSld>
     <p:spTree>
@@ -4119,7 +4873,7 @@
         </p:blipFill>
         <p:spPr>
           <a:xfrm>
-            <a:off x="1630200" y="1052737"/>
+            <a:off x="366600" y="966337"/>
             <a:ext cx="4251960" cy="3637598"/>
           </a:xfrm>
           <a:prstGeom prst="rect">
@@ -4127,10 +4881,666 @@
           </a:prstGeom>
         </p:spPr>
       </p:pic>
+      <p:pic>
+        <p:nvPicPr>
+          <p:cNvPr id="2" name="Picture 1"/>
+          <p:cNvPicPr>
+            <a:picLocks noChangeAspect="1"/>
+          </p:cNvPicPr>
+          <p:nvPr/>
+        </p:nvPicPr>
+        <p:blipFill>
+          <a:blip r:embed="rId3"/>
+          <a:stretch>
+            <a:fillRect/>
+          </a:stretch>
+        </p:blipFill>
+        <p:spPr>
+          <a:xfrm>
+            <a:off x="4964476" y="758887"/>
+            <a:ext cx="2931795" cy="4563428"/>
+          </a:xfrm>
+          <a:prstGeom prst="rect">
+            <a:avLst/>
+          </a:prstGeom>
+          <a:ln>
+            <a:solidFill>
+              <a:srgbClr val="C00000"/>
+            </a:solidFill>
+          </a:ln>
+        </p:spPr>
+      </p:pic>
+      <p:pic>
+        <p:nvPicPr>
+          <p:cNvPr id="4" name="Picture 3"/>
+          <p:cNvPicPr>
+            <a:picLocks noChangeAspect="1"/>
+          </p:cNvPicPr>
+          <p:nvPr/>
+        </p:nvPicPr>
+        <p:blipFill>
+          <a:blip r:embed="rId4"/>
+          <a:stretch>
+            <a:fillRect/>
+          </a:stretch>
+        </p:blipFill>
+        <p:spPr>
+          <a:xfrm>
+            <a:off x="8598037" y="690487"/>
+            <a:ext cx="2928938" cy="4566285"/>
+          </a:xfrm>
+          <a:prstGeom prst="rect">
+            <a:avLst/>
+          </a:prstGeom>
+          <a:ln>
+            <a:solidFill>
+              <a:srgbClr val="C00000"/>
+            </a:solidFill>
+          </a:ln>
+        </p:spPr>
+      </p:pic>
+      <p:cxnSp>
+        <p:nvCxnSpPr>
+          <p:cNvPr id="5" name="Straight Connector 4"/>
+          <p:cNvCxnSpPr/>
+          <p:nvPr/>
+        </p:nvCxnSpPr>
+        <p:spPr>
+          <a:xfrm>
+            <a:off x="7768800" y="2785136"/>
+            <a:ext cx="0" cy="1285200"/>
+          </a:xfrm>
+          <a:prstGeom prst="line">
+            <a:avLst/>
+          </a:prstGeom>
+          <a:ln w="28575">
+            <a:solidFill>
+              <a:srgbClr val="C00000"/>
+            </a:solidFill>
+            <a:headEnd type="none" w="med" len="med"/>
+            <a:tailEnd type="arrow" w="med" len="med"/>
+          </a:ln>
+        </p:spPr>
+        <p:style>
+          <a:lnRef idx="1">
+            <a:schemeClr val="accent1"/>
+          </a:lnRef>
+          <a:fillRef idx="0">
+            <a:schemeClr val="accent1"/>
+          </a:fillRef>
+          <a:effectRef idx="0">
+            <a:schemeClr val="accent1"/>
+          </a:effectRef>
+          <a:fontRef idx="minor">
+            <a:schemeClr val="tx1"/>
+          </a:fontRef>
+        </p:style>
+      </p:cxnSp>
+      <p:sp>
+        <p:nvSpPr>
+          <p:cNvPr id="6" name="TextBox 5"/>
+          <p:cNvSpPr txBox="1"/>
+          <p:nvPr/>
+        </p:nvSpPr>
+        <p:spPr>
+          <a:xfrm flipV="1">
+            <a:off x="5008396" y="1020156"/>
+            <a:ext cx="1014403" cy="196644"/>
+          </a:xfrm>
+          <a:prstGeom prst="rect">
+            <a:avLst/>
+          </a:prstGeom>
+          <a:noFill/>
+          <a:ln w="19050">
+            <a:solidFill>
+              <a:srgbClr val="C00000"/>
+            </a:solidFill>
+            <a:prstDash val="sysDash"/>
+          </a:ln>
+          <a:effectLst>
+            <a:outerShdw blurRad="50800" dist="38100" dir="2700000" algn="tl" rotWithShape="0">
+              <a:prstClr val="black">
+                <a:alpha val="40000"/>
+              </a:prstClr>
+            </a:outerShdw>
+          </a:effectLst>
+        </p:spPr>
+        <p:txBody>
+          <a:bodyPr wrap="square" rtlCol="0">
+            <a:spAutoFit/>
+          </a:bodyPr>
+          <a:lstStyle/>
+          <a:p>
+            <a:endParaRPr lang="en-NZ" sz="1200" dirty="0"/>
+          </a:p>
+        </p:txBody>
+      </p:sp>
+      <p:sp>
+        <p:nvSpPr>
+          <p:cNvPr id="7" name="TextBox 6"/>
+          <p:cNvSpPr txBox="1"/>
+          <p:nvPr/>
+        </p:nvSpPr>
+        <p:spPr>
+          <a:xfrm>
+            <a:off x="7401876" y="3062737"/>
+            <a:ext cx="1196161" cy="338554"/>
+          </a:xfrm>
+          <a:prstGeom prst="rect">
+            <a:avLst/>
+          </a:prstGeom>
+          <a:solidFill>
+            <a:schemeClr val="bg1"/>
+          </a:solidFill>
+        </p:spPr>
+        <p:txBody>
+          <a:bodyPr wrap="none" rtlCol="0">
+            <a:spAutoFit/>
+          </a:bodyPr>
+          <a:lstStyle/>
+          <a:p>
+            <a:r>
+              <a:rPr lang="en-NZ" sz="800" b="1" dirty="0" smtClean="0">
+                <a:solidFill>
+                  <a:srgbClr val="C00000"/>
+                </a:solidFill>
+              </a:rPr>
+              <a:t>Scrolling down to</a:t>
+            </a:r>
+          </a:p>
+          <a:p>
+            <a:pPr algn="ctr"/>
+            <a:r>
+              <a:rPr lang="en-NZ" sz="800" b="1" dirty="0" smtClean="0">
+                <a:solidFill>
+                  <a:srgbClr val="C00000"/>
+                </a:solidFill>
+              </a:rPr>
+              <a:t>see the rest</a:t>
+            </a:r>
+            <a:endParaRPr lang="en-NZ" sz="800" b="1" dirty="0">
+              <a:solidFill>
+                <a:srgbClr val="C00000"/>
+              </a:solidFill>
+            </a:endParaRPr>
+          </a:p>
+        </p:txBody>
+      </p:sp>
+      <p:sp>
+        <p:nvSpPr>
+          <p:cNvPr id="11" name="TextBox 10"/>
+          <p:cNvSpPr txBox="1"/>
+          <p:nvPr/>
+        </p:nvSpPr>
+        <p:spPr>
+          <a:xfrm flipV="1">
+            <a:off x="9555304" y="1928556"/>
+            <a:ext cx="1014403" cy="196644"/>
+          </a:xfrm>
+          <a:prstGeom prst="rect">
+            <a:avLst/>
+          </a:prstGeom>
+          <a:noFill/>
+          <a:ln w="19050">
+            <a:solidFill>
+              <a:srgbClr val="C00000"/>
+            </a:solidFill>
+            <a:prstDash val="sysDash"/>
+          </a:ln>
+          <a:effectLst>
+            <a:outerShdw blurRad="50800" dist="38100" dir="2700000" algn="tl" rotWithShape="0">
+              <a:prstClr val="black">
+                <a:alpha val="40000"/>
+              </a:prstClr>
+            </a:outerShdw>
+          </a:effectLst>
+        </p:spPr>
+        <p:txBody>
+          <a:bodyPr wrap="square" rtlCol="0">
+            <a:spAutoFit/>
+          </a:bodyPr>
+          <a:lstStyle/>
+          <a:p>
+            <a:endParaRPr lang="en-NZ" sz="1200" dirty="0"/>
+          </a:p>
+        </p:txBody>
+      </p:sp>
+      <p:cxnSp>
+        <p:nvCxnSpPr>
+          <p:cNvPr id="13" name="Straight Connector 12"/>
+          <p:cNvCxnSpPr/>
+          <p:nvPr/>
+        </p:nvCxnSpPr>
+        <p:spPr>
+          <a:xfrm flipV="1">
+            <a:off x="8355600" y="2307600"/>
+            <a:ext cx="1116000" cy="799200"/>
+          </a:xfrm>
+          <a:prstGeom prst="line">
+            <a:avLst/>
+          </a:prstGeom>
+          <a:ln w="28575">
+            <a:solidFill>
+              <a:srgbClr val="C00000"/>
+            </a:solidFill>
+            <a:headEnd type="none" w="med" len="med"/>
+            <a:tailEnd type="arrow" w="med" len="med"/>
+          </a:ln>
+        </p:spPr>
+        <p:style>
+          <a:lnRef idx="1">
+            <a:schemeClr val="accent1"/>
+          </a:lnRef>
+          <a:fillRef idx="0">
+            <a:schemeClr val="accent1"/>
+          </a:fillRef>
+          <a:effectRef idx="0">
+            <a:schemeClr val="accent1"/>
+          </a:effectRef>
+          <a:fontRef idx="minor">
+            <a:schemeClr val="tx1"/>
+          </a:fontRef>
+        </p:style>
+      </p:cxnSp>
+      <p:sp>
+        <p:nvSpPr>
+          <p:cNvPr id="17" name="TextBox 16"/>
+          <p:cNvSpPr txBox="1"/>
+          <p:nvPr/>
+        </p:nvSpPr>
+        <p:spPr>
+          <a:xfrm flipV="1">
+            <a:off x="6096796" y="1813356"/>
+            <a:ext cx="1014403" cy="196644"/>
+          </a:xfrm>
+          <a:prstGeom prst="rect">
+            <a:avLst/>
+          </a:prstGeom>
+          <a:noFill/>
+          <a:ln w="19050">
+            <a:solidFill>
+              <a:srgbClr val="C00000"/>
+            </a:solidFill>
+            <a:prstDash val="sysDash"/>
+          </a:ln>
+          <a:effectLst>
+            <a:outerShdw blurRad="50800" dist="38100" dir="2700000" algn="tl" rotWithShape="0">
+              <a:prstClr val="black">
+                <a:alpha val="40000"/>
+              </a:prstClr>
+            </a:outerShdw>
+          </a:effectLst>
+        </p:spPr>
+        <p:txBody>
+          <a:bodyPr wrap="square" rtlCol="0">
+            <a:spAutoFit/>
+          </a:bodyPr>
+          <a:lstStyle/>
+          <a:p>
+            <a:endParaRPr lang="en-NZ" sz="1200" dirty="0"/>
+          </a:p>
+        </p:txBody>
+      </p:sp>
+      <p:sp>
+        <p:nvSpPr>
+          <p:cNvPr id="18" name="TextBox 17"/>
+          <p:cNvSpPr txBox="1"/>
+          <p:nvPr/>
+        </p:nvSpPr>
+        <p:spPr>
+          <a:xfrm flipV="1">
+            <a:off x="8713996" y="1014556"/>
+            <a:ext cx="1014403" cy="196644"/>
+          </a:xfrm>
+          <a:prstGeom prst="rect">
+            <a:avLst/>
+          </a:prstGeom>
+          <a:noFill/>
+          <a:ln w="19050">
+            <a:solidFill>
+              <a:srgbClr val="C00000"/>
+            </a:solidFill>
+            <a:prstDash val="sysDash"/>
+          </a:ln>
+          <a:effectLst>
+            <a:outerShdw blurRad="50800" dist="38100" dir="2700000" algn="tl" rotWithShape="0">
+              <a:prstClr val="black">
+                <a:alpha val="40000"/>
+              </a:prstClr>
+            </a:outerShdw>
+          </a:effectLst>
+        </p:spPr>
+        <p:txBody>
+          <a:bodyPr wrap="square" rtlCol="0">
+            <a:spAutoFit/>
+          </a:bodyPr>
+          <a:lstStyle/>
+          <a:p>
+            <a:endParaRPr lang="en-NZ" sz="1200" dirty="0"/>
+          </a:p>
+        </p:txBody>
+      </p:sp>
     </p:spTree>
     <p:extLst>
       <p:ext uri="{BB962C8B-B14F-4D97-AF65-F5344CB8AC3E}">
         <p14:creationId xmlns:p14="http://schemas.microsoft.com/office/powerpoint/2010/main" val="427333399"/>
+      </p:ext>
+    </p:extLst>
+  </p:cSld>
+  <p:clrMapOvr>
+    <a:masterClrMapping/>
+  </p:clrMapOvr>
+</p:sld>
+</file>
+
+<file path=ppt/slides/slide7.xml><?xml version="1.0" encoding="utf-8"?>
+<p:sld xmlns:a="http://schemas.openxmlformats.org/drawingml/2006/main" xmlns:r="http://schemas.openxmlformats.org/officeDocument/2006/relationships" xmlns:p="http://schemas.openxmlformats.org/presentationml/2006/main">
+  <p:cSld>
+    <p:spTree>
+      <p:nvGrpSpPr>
+        <p:cNvPr id="1" name=""/>
+        <p:cNvGrpSpPr/>
+        <p:nvPr/>
+      </p:nvGrpSpPr>
+      <p:grpSpPr>
+        <a:xfrm>
+          <a:off x="0" y="0"/>
+          <a:ext cx="0" cy="0"/>
+          <a:chOff x="0" y="0"/>
+          <a:chExt cx="0" cy="0"/>
+        </a:xfrm>
+      </p:grpSpPr>
+      <p:pic>
+        <p:nvPicPr>
+          <p:cNvPr id="10" name="Picture 9"/>
+          <p:cNvPicPr>
+            <a:picLocks noChangeAspect="1"/>
+          </p:cNvPicPr>
+          <p:nvPr/>
+        </p:nvPicPr>
+        <p:blipFill>
+          <a:blip r:embed="rId2"/>
+          <a:stretch>
+            <a:fillRect/>
+          </a:stretch>
+        </p:blipFill>
+        <p:spPr>
+          <a:xfrm>
+            <a:off x="8048831" y="1189672"/>
+            <a:ext cx="3148965" cy="2740343"/>
+          </a:xfrm>
+          <a:prstGeom prst="rect">
+            <a:avLst/>
+          </a:prstGeom>
+          <a:ln>
+            <a:solidFill>
+              <a:srgbClr val="C00000"/>
+            </a:solidFill>
+          </a:ln>
+        </p:spPr>
+      </p:pic>
+      <p:pic>
+        <p:nvPicPr>
+          <p:cNvPr id="9" name="Picture 8"/>
+          <p:cNvPicPr>
+            <a:picLocks noChangeAspect="1"/>
+          </p:cNvPicPr>
+          <p:nvPr/>
+        </p:nvPicPr>
+        <p:blipFill>
+          <a:blip r:embed="rId3"/>
+          <a:stretch>
+            <a:fillRect/>
+          </a:stretch>
+        </p:blipFill>
+        <p:spPr>
+          <a:xfrm>
+            <a:off x="4378369" y="1252537"/>
+            <a:ext cx="2263140" cy="2677478"/>
+          </a:xfrm>
+          <a:prstGeom prst="rect">
+            <a:avLst/>
+          </a:prstGeom>
+          <a:ln>
+            <a:solidFill>
+              <a:srgbClr val="C00000"/>
+            </a:solidFill>
+          </a:ln>
+        </p:spPr>
+      </p:pic>
+      <p:sp>
+        <p:nvSpPr>
+          <p:cNvPr id="4" name="Rectangle 3"/>
+          <p:cNvSpPr/>
+          <p:nvPr/>
+        </p:nvSpPr>
+        <p:spPr>
+          <a:xfrm>
+            <a:off x="4378369" y="1586415"/>
+            <a:ext cx="1043231" cy="2229585"/>
+          </a:xfrm>
+          <a:prstGeom prst="rect">
+            <a:avLst/>
+          </a:prstGeom>
+          <a:solidFill>
+            <a:srgbClr val="FFFFFF">
+              <a:alpha val="92000"/>
+            </a:srgbClr>
+          </a:solidFill>
+          <a:ln>
+            <a:noFill/>
+          </a:ln>
+        </p:spPr>
+        <p:style>
+          <a:lnRef idx="2">
+            <a:schemeClr val="accent1">
+              <a:shade val="50000"/>
+            </a:schemeClr>
+          </a:lnRef>
+          <a:fillRef idx="1">
+            <a:schemeClr val="accent1"/>
+          </a:fillRef>
+          <a:effectRef idx="0">
+            <a:schemeClr val="accent1"/>
+          </a:effectRef>
+          <a:fontRef idx="minor">
+            <a:schemeClr val="lt1"/>
+          </a:fontRef>
+        </p:style>
+        <p:txBody>
+          <a:bodyPr rtlCol="0" anchor="ctr"/>
+          <a:lstStyle/>
+          <a:p>
+            <a:pPr algn="ctr"/>
+            <a:endParaRPr lang="en-NZ"/>
+          </a:p>
+        </p:txBody>
+      </p:sp>
+      <p:sp>
+        <p:nvSpPr>
+          <p:cNvPr id="5" name="TextBox 4"/>
+          <p:cNvSpPr txBox="1"/>
+          <p:nvPr/>
+        </p:nvSpPr>
+        <p:spPr>
+          <a:xfrm flipV="1">
+            <a:off x="5421600" y="1304556"/>
+            <a:ext cx="684000" cy="167844"/>
+          </a:xfrm>
+          <a:prstGeom prst="rect">
+            <a:avLst/>
+          </a:prstGeom>
+          <a:noFill/>
+          <a:ln w="19050">
+            <a:solidFill>
+              <a:srgbClr val="C00000"/>
+            </a:solidFill>
+            <a:prstDash val="sysDash"/>
+          </a:ln>
+          <a:effectLst>
+            <a:outerShdw blurRad="50800" dist="38100" dir="2700000" algn="tl" rotWithShape="0">
+              <a:prstClr val="black">
+                <a:alpha val="40000"/>
+              </a:prstClr>
+            </a:outerShdw>
+          </a:effectLst>
+        </p:spPr>
+        <p:txBody>
+          <a:bodyPr wrap="square" rtlCol="0">
+            <a:spAutoFit/>
+          </a:bodyPr>
+          <a:lstStyle/>
+          <a:p>
+            <a:endParaRPr lang="en-NZ" sz="1200" dirty="0"/>
+          </a:p>
+        </p:txBody>
+      </p:sp>
+      <p:sp>
+        <p:nvSpPr>
+          <p:cNvPr id="6" name="TextBox 5"/>
+          <p:cNvSpPr txBox="1"/>
+          <p:nvPr/>
+        </p:nvSpPr>
+        <p:spPr>
+          <a:xfrm>
+            <a:off x="6770062" y="1472400"/>
+            <a:ext cx="979755" cy="461665"/>
+          </a:xfrm>
+          <a:prstGeom prst="rect">
+            <a:avLst/>
+          </a:prstGeom>
+          <a:solidFill>
+            <a:schemeClr val="bg1"/>
+          </a:solidFill>
+        </p:spPr>
+        <p:txBody>
+          <a:bodyPr wrap="none" rtlCol="0">
+            <a:spAutoFit/>
+          </a:bodyPr>
+          <a:lstStyle/>
+          <a:p>
+            <a:pPr algn="ctr"/>
+            <a:r>
+              <a:rPr lang="en-NZ" sz="800" dirty="0" smtClean="0">
+                <a:solidFill>
+                  <a:srgbClr val="C00000"/>
+                </a:solidFill>
+              </a:rPr>
+              <a:t>(Left-hand)</a:t>
+            </a:r>
+          </a:p>
+          <a:p>
+            <a:pPr algn="ctr"/>
+            <a:r>
+              <a:rPr lang="en-NZ" sz="800" b="1" dirty="0" smtClean="0">
+                <a:solidFill>
+                  <a:srgbClr val="C00000"/>
+                </a:solidFill>
+              </a:rPr>
+              <a:t>C</a:t>
+            </a:r>
+            <a:r>
+              <a:rPr lang="en-NZ" sz="800" b="1" dirty="0" smtClean="0">
+                <a:solidFill>
+                  <a:srgbClr val="C00000"/>
+                </a:solidFill>
+              </a:rPr>
+              <a:t>ontrol panel</a:t>
+            </a:r>
+          </a:p>
+          <a:p>
+            <a:pPr algn="ctr"/>
+            <a:r>
+              <a:rPr lang="en-NZ" sz="800" b="1" dirty="0" smtClean="0">
+                <a:solidFill>
+                  <a:srgbClr val="C00000"/>
+                </a:solidFill>
+              </a:rPr>
+              <a:t>changes to </a:t>
+            </a:r>
+          </a:p>
+        </p:txBody>
+      </p:sp>
+      <p:cxnSp>
+        <p:nvCxnSpPr>
+          <p:cNvPr id="7" name="Straight Connector 6"/>
+          <p:cNvCxnSpPr/>
+          <p:nvPr/>
+        </p:nvCxnSpPr>
+        <p:spPr>
+          <a:xfrm>
+            <a:off x="6966306" y="1987200"/>
+            <a:ext cx="604800" cy="7200"/>
+          </a:xfrm>
+          <a:prstGeom prst="line">
+            <a:avLst/>
+          </a:prstGeom>
+          <a:ln w="28575">
+            <a:solidFill>
+              <a:srgbClr val="C00000"/>
+            </a:solidFill>
+            <a:headEnd type="none" w="med" len="med"/>
+            <a:tailEnd type="arrow" w="med" len="med"/>
+          </a:ln>
+        </p:spPr>
+        <p:style>
+          <a:lnRef idx="1">
+            <a:schemeClr val="accent1"/>
+          </a:lnRef>
+          <a:fillRef idx="0">
+            <a:schemeClr val="accent1"/>
+          </a:fillRef>
+          <a:effectRef idx="0">
+            <a:schemeClr val="accent1"/>
+          </a:effectRef>
+          <a:fontRef idx="minor">
+            <a:schemeClr val="tx1"/>
+          </a:fontRef>
+        </p:style>
+      </p:cxnSp>
+      <p:sp>
+        <p:nvSpPr>
+          <p:cNvPr id="8" name="TextBox 7"/>
+          <p:cNvSpPr txBox="1"/>
+          <p:nvPr/>
+        </p:nvSpPr>
+        <p:spPr>
+          <a:xfrm flipV="1">
+            <a:off x="5476525" y="3642078"/>
+            <a:ext cx="898799" cy="173922"/>
+          </a:xfrm>
+          <a:prstGeom prst="rect">
+            <a:avLst/>
+          </a:prstGeom>
+          <a:noFill/>
+          <a:ln w="19050">
+            <a:solidFill>
+              <a:srgbClr val="C00000"/>
+            </a:solidFill>
+            <a:prstDash val="sysDash"/>
+          </a:ln>
+          <a:effectLst>
+            <a:outerShdw blurRad="50800" dist="38100" dir="2700000" algn="tl" rotWithShape="0">
+              <a:prstClr val="black">
+                <a:alpha val="40000"/>
+              </a:prstClr>
+            </a:outerShdw>
+          </a:effectLst>
+        </p:spPr>
+        <p:txBody>
+          <a:bodyPr wrap="square" rtlCol="0">
+            <a:spAutoFit/>
+          </a:bodyPr>
+          <a:lstStyle/>
+          <a:p>
+            <a:endParaRPr lang="en-NZ" sz="1200" dirty="0"/>
+          </a:p>
+        </p:txBody>
+      </p:sp>
+    </p:spTree>
+    <p:extLst>
+      <p:ext uri="{BB962C8B-B14F-4D97-AF65-F5344CB8AC3E}">
+        <p14:creationId xmlns:p14="http://schemas.microsoft.com/office/powerpoint/2010/main" val="2426768421"/>
       </p:ext>
     </p:extLst>
   </p:cSld>

</xml_diff>